<commit_message>
added notes and small reorg to headspring slides
</commit_message>
<xml_diff>
--- a/Headspring.pptx
+++ b/Headspring.pptx
@@ -18,8 +18,8 @@
     <p:sldId id="263" r:id="rId9"/>
     <p:sldId id="264" r:id="rId10"/>
     <p:sldId id="265" r:id="rId11"/>
-    <p:sldId id="266" r:id="rId12"/>
-    <p:sldId id="267" r:id="rId13"/>
+    <p:sldId id="267" r:id="rId12"/>
+    <p:sldId id="266" r:id="rId13"/>
     <p:sldId id="268" r:id="rId14"/>
     <p:sldId id="269" r:id="rId15"/>
     <p:sldId id="270" r:id="rId16"/>
@@ -214,7 +214,8 @@
           <a:p>
             <a:fld id="{7072611E-5E6A-420E-9E03-EF7E4D75AE23}" type="datetimeFigureOut">
               <a:rPr lang="en-US" smtClean="0"/>
-              <a:t>12/14/2009</a:t>
+              <a:pPr/>
+              <a:t>12/15/2009</a:t>
             </a:fld>
             <a:endParaRPr lang="en-US"/>
           </a:p>
@@ -375,6 +376,7 @@
           <a:p>
             <a:fld id="{A30BF6A9-19BC-4964-AB25-3E1076347DF9}" type="slidenum">
               <a:rPr lang="en-US" smtClean="0"/>
+              <a:pPr/>
               <a:t>‹#›</a:t>
             </a:fld>
             <a:endParaRPr lang="en-US"/>
@@ -527,6 +529,760 @@
           <a:p>
             <a:r>
               <a:rPr lang="en-US" dirty="0" smtClean="0"/>
+              <a:t>What is inversion</a:t>
+            </a:r>
+            <a:r>
+              <a:rPr lang="en-US" baseline="0" dirty="0" smtClean="0"/>
+              <a:t> of control?</a:t>
+            </a:r>
+            <a:endParaRPr lang="en-US" dirty="0" smtClean="0"/>
+          </a:p>
+          <a:p>
+            <a:endParaRPr lang="en-US" dirty="0" smtClean="0"/>
+          </a:p>
+          <a:p>
+            <a:endParaRPr lang="en-US" dirty="0" smtClean="0"/>
+          </a:p>
+          <a:p>
+            <a:r>
+              <a:rPr lang="en-US" dirty="0" smtClean="0"/>
+              <a:t>What is an</a:t>
+            </a:r>
+            <a:r>
+              <a:rPr lang="en-US" baseline="0" dirty="0" smtClean="0"/>
+              <a:t> IOC tool?</a:t>
+            </a:r>
+          </a:p>
+          <a:p>
+            <a:endParaRPr lang="en-US" baseline="0" dirty="0" smtClean="0"/>
+          </a:p>
+          <a:p>
+            <a:r>
+              <a:rPr lang="en-US" baseline="0" dirty="0" smtClean="0"/>
+              <a:t>Delivers objects with pre-built and pre-wired dependencies right in there.  An entire object graph created via configuration and reflection rather than the new operator.</a:t>
+            </a:r>
+          </a:p>
+          <a:p>
+            <a:endParaRPr lang="en-US" baseline="0" dirty="0" smtClean="0"/>
+          </a:p>
+          <a:p>
+            <a:pPr marL="0" marR="0" indent="0" algn="l" defTabSz="914400" rtl="0" eaLnBrk="1" fontAlgn="auto" latinLnBrk="0" hangingPunct="1">
+              <a:lnSpc>
+                <a:spcPct val="100000"/>
+              </a:lnSpc>
+              <a:spcBef>
+                <a:spcPts val="0"/>
+              </a:spcBef>
+              <a:spcAft>
+                <a:spcPts val="0"/>
+              </a:spcAft>
+              <a:buClrTx/>
+              <a:buSzTx/>
+              <a:buFontTx/>
+              <a:buNone/>
+              <a:tabLst/>
+              <a:defRPr/>
+            </a:pPr>
+            <a:r>
+              <a:rPr lang="en-US" baseline="0" dirty="0" smtClean="0"/>
+              <a:t>Imagine you have an email sending class.. Let’s call it.. </a:t>
+            </a:r>
+            <a:endParaRPr lang="en-US" baseline="0" dirty="0" smtClean="0"/>
+          </a:p>
+        </p:txBody>
+      </p:sp>
+      <p:sp>
+        <p:nvSpPr>
+          <p:cNvPr id="4" name="Slide Number Placeholder 3"/>
+          <p:cNvSpPr>
+            <a:spLocks noGrp="1"/>
+          </p:cNvSpPr>
+          <p:nvPr>
+            <p:ph type="sldNum" sz="quarter" idx="10"/>
+          </p:nvPr>
+        </p:nvSpPr>
+        <p:spPr/>
+        <p:txBody>
+          <a:bodyPr/>
+          <a:lstStyle/>
+          <a:p>
+            <a:fld id="{A30BF6A9-19BC-4964-AB25-3E1076347DF9}" type="slidenum">
+              <a:rPr lang="en-US" smtClean="0"/>
+              <a:pPr/>
+              <a:t>2</a:t>
+            </a:fld>
+            <a:endParaRPr lang="en-US"/>
+          </a:p>
+        </p:txBody>
+      </p:sp>
+    </p:spTree>
+  </p:cSld>
+  <p:clrMapOvr>
+    <a:masterClrMapping/>
+  </p:clrMapOvr>
+</p:notes>
+</file>
+
+<file path=ppt/notesSlides/notesSlide2.xml><?xml version="1.0" encoding="utf-8"?>
+<p:notes xmlns:a="http://schemas.openxmlformats.org/drawingml/2006/main" xmlns:r="http://schemas.openxmlformats.org/officeDocument/2006/relationships" xmlns:p="http://schemas.openxmlformats.org/presentationml/2006/main">
+  <p:cSld>
+    <p:spTree>
+      <p:nvGrpSpPr>
+        <p:cNvPr id="1" name=""/>
+        <p:cNvGrpSpPr/>
+        <p:nvPr/>
+      </p:nvGrpSpPr>
+      <p:grpSpPr>
+        <a:xfrm>
+          <a:off x="0" y="0"/>
+          <a:ext cx="0" cy="0"/>
+          <a:chOff x="0" y="0"/>
+          <a:chExt cx="0" cy="0"/>
+        </a:xfrm>
+      </p:grpSpPr>
+      <p:sp>
+        <p:nvSpPr>
+          <p:cNvPr id="2" name="Slide Image Placeholder 1"/>
+          <p:cNvSpPr>
+            <a:spLocks noGrp="1" noRot="1" noChangeAspect="1"/>
+          </p:cNvSpPr>
+          <p:nvPr>
+            <p:ph type="sldImg"/>
+          </p:nvPr>
+        </p:nvSpPr>
+        <p:spPr/>
+      </p:sp>
+      <p:sp>
+        <p:nvSpPr>
+          <p:cNvPr id="3" name="Notes Placeholder 2"/>
+          <p:cNvSpPr>
+            <a:spLocks noGrp="1"/>
+          </p:cNvSpPr>
+          <p:nvPr>
+            <p:ph type="body" idx="1"/>
+          </p:nvPr>
+        </p:nvSpPr>
+        <p:spPr/>
+        <p:txBody>
+          <a:bodyPr>
+            <a:normAutofit/>
+          </a:bodyPr>
+          <a:lstStyle/>
+          <a:p>
+            <a:pPr marL="0" marR="0" indent="0" algn="l" defTabSz="914400" rtl="0" eaLnBrk="1" fontAlgn="auto" latinLnBrk="0" hangingPunct="1">
+              <a:lnSpc>
+                <a:spcPct val="100000"/>
+              </a:lnSpc>
+              <a:spcBef>
+                <a:spcPts val="0"/>
+              </a:spcBef>
+              <a:spcAft>
+                <a:spcPts val="0"/>
+              </a:spcAft>
+              <a:buClrTx/>
+              <a:buSzTx/>
+              <a:buFontTx/>
+              <a:buNone/>
+              <a:tabLst/>
+              <a:defRPr/>
+            </a:pPr>
+            <a:r>
+              <a:rPr lang="en-US" dirty="0" smtClean="0"/>
+              <a:t>But this</a:t>
+            </a:r>
+            <a:r>
+              <a:rPr lang="en-US" baseline="0" dirty="0" smtClean="0"/>
+              <a:t> – the use of the ‘new’ keyword – creates a tight coupling that is hard to change.</a:t>
+            </a:r>
+            <a:endParaRPr lang="en-US" dirty="0" smtClean="0"/>
+          </a:p>
+          <a:p>
+            <a:endParaRPr lang="en-US" dirty="0"/>
+          </a:p>
+        </p:txBody>
+      </p:sp>
+      <p:sp>
+        <p:nvSpPr>
+          <p:cNvPr id="4" name="Slide Number Placeholder 3"/>
+          <p:cNvSpPr>
+            <a:spLocks noGrp="1"/>
+          </p:cNvSpPr>
+          <p:nvPr>
+            <p:ph type="sldNum" sz="quarter" idx="10"/>
+          </p:nvPr>
+        </p:nvSpPr>
+        <p:spPr/>
+        <p:txBody>
+          <a:bodyPr/>
+          <a:lstStyle/>
+          <a:p>
+            <a:fld id="{A30BF6A9-19BC-4964-AB25-3E1076347DF9}" type="slidenum">
+              <a:rPr lang="en-US" smtClean="0"/>
+              <a:pPr/>
+              <a:t>7</a:t>
+            </a:fld>
+            <a:endParaRPr lang="en-US"/>
+          </a:p>
+        </p:txBody>
+      </p:sp>
+    </p:spTree>
+  </p:cSld>
+  <p:clrMapOvr>
+    <a:masterClrMapping/>
+  </p:clrMapOvr>
+</p:notes>
+</file>
+
+<file path=ppt/notesSlides/notesSlide3.xml><?xml version="1.0" encoding="utf-8"?>
+<p:notes xmlns:a="http://schemas.openxmlformats.org/drawingml/2006/main" xmlns:r="http://schemas.openxmlformats.org/officeDocument/2006/relationships" xmlns:p="http://schemas.openxmlformats.org/presentationml/2006/main">
+  <p:cSld>
+    <p:spTree>
+      <p:nvGrpSpPr>
+        <p:cNvPr id="1" name=""/>
+        <p:cNvGrpSpPr/>
+        <p:nvPr/>
+      </p:nvGrpSpPr>
+      <p:grpSpPr>
+        <a:xfrm>
+          <a:off x="0" y="0"/>
+          <a:ext cx="0" cy="0"/>
+          <a:chOff x="0" y="0"/>
+          <a:chExt cx="0" cy="0"/>
+        </a:xfrm>
+      </p:grpSpPr>
+      <p:sp>
+        <p:nvSpPr>
+          <p:cNvPr id="2" name="Slide Image Placeholder 1"/>
+          <p:cNvSpPr>
+            <a:spLocks noGrp="1" noRot="1" noChangeAspect="1"/>
+          </p:cNvSpPr>
+          <p:nvPr>
+            <p:ph type="sldImg"/>
+          </p:nvPr>
+        </p:nvSpPr>
+        <p:spPr/>
+      </p:sp>
+      <p:sp>
+        <p:nvSpPr>
+          <p:cNvPr id="3" name="Notes Placeholder 2"/>
+          <p:cNvSpPr>
+            <a:spLocks noGrp="1"/>
+          </p:cNvSpPr>
+          <p:nvPr>
+            <p:ph type="body" idx="1"/>
+          </p:nvPr>
+        </p:nvSpPr>
+        <p:spPr/>
+        <p:txBody>
+          <a:bodyPr>
+            <a:normAutofit/>
+          </a:bodyPr>
+          <a:lstStyle/>
+          <a:p>
+            <a:pPr marL="0" marR="0" indent="0" algn="l" defTabSz="914400" rtl="0" eaLnBrk="1" fontAlgn="auto" latinLnBrk="0" hangingPunct="1">
+              <a:lnSpc>
+                <a:spcPct val="100000"/>
+              </a:lnSpc>
+              <a:spcBef>
+                <a:spcPts val="0"/>
+              </a:spcBef>
+              <a:spcAft>
+                <a:spcPts val="0"/>
+              </a:spcAft>
+              <a:buClrTx/>
+              <a:buSzTx/>
+              <a:buFontTx/>
+              <a:buNone/>
+              <a:tabLst/>
+              <a:defRPr/>
+            </a:pPr>
+            <a:r>
+              <a:rPr lang="en-US" dirty="0" smtClean="0"/>
+              <a:t>Between</a:t>
+            </a:r>
+            <a:r>
+              <a:rPr lang="en-US" baseline="0" dirty="0" smtClean="0"/>
+              <a:t> objects, but also between the other dependencies of those objects.  Think UI vs. Data access!</a:t>
+            </a:r>
+            <a:endParaRPr lang="en-US" dirty="0" smtClean="0"/>
+          </a:p>
+          <a:p>
+            <a:endParaRPr lang="en-US" dirty="0"/>
+          </a:p>
+        </p:txBody>
+      </p:sp>
+      <p:sp>
+        <p:nvSpPr>
+          <p:cNvPr id="4" name="Slide Number Placeholder 3"/>
+          <p:cNvSpPr>
+            <a:spLocks noGrp="1"/>
+          </p:cNvSpPr>
+          <p:nvPr>
+            <p:ph type="sldNum" sz="quarter" idx="10"/>
+          </p:nvPr>
+        </p:nvSpPr>
+        <p:spPr/>
+        <p:txBody>
+          <a:bodyPr/>
+          <a:lstStyle/>
+          <a:p>
+            <a:fld id="{A30BF6A9-19BC-4964-AB25-3E1076347DF9}" type="slidenum">
+              <a:rPr lang="en-US" smtClean="0"/>
+              <a:pPr/>
+              <a:t>8</a:t>
+            </a:fld>
+            <a:endParaRPr lang="en-US"/>
+          </a:p>
+        </p:txBody>
+      </p:sp>
+    </p:spTree>
+  </p:cSld>
+  <p:clrMapOvr>
+    <a:masterClrMapping/>
+  </p:clrMapOvr>
+</p:notes>
+</file>
+
+<file path=ppt/notesSlides/notesSlide4.xml><?xml version="1.0" encoding="utf-8"?>
+<p:notes xmlns:a="http://schemas.openxmlformats.org/drawingml/2006/main" xmlns:r="http://schemas.openxmlformats.org/officeDocument/2006/relationships" xmlns:p="http://schemas.openxmlformats.org/presentationml/2006/main">
+  <p:cSld>
+    <p:spTree>
+      <p:nvGrpSpPr>
+        <p:cNvPr id="1" name=""/>
+        <p:cNvGrpSpPr/>
+        <p:nvPr/>
+      </p:nvGrpSpPr>
+      <p:grpSpPr>
+        <a:xfrm>
+          <a:off x="0" y="0"/>
+          <a:ext cx="0" cy="0"/>
+          <a:chOff x="0" y="0"/>
+          <a:chExt cx="0" cy="0"/>
+        </a:xfrm>
+      </p:grpSpPr>
+      <p:sp>
+        <p:nvSpPr>
+          <p:cNvPr id="2" name="Slide Image Placeholder 1"/>
+          <p:cNvSpPr>
+            <a:spLocks noGrp="1" noRot="1" noChangeAspect="1"/>
+          </p:cNvSpPr>
+          <p:nvPr>
+            <p:ph type="sldImg"/>
+          </p:nvPr>
+        </p:nvSpPr>
+        <p:spPr/>
+      </p:sp>
+      <p:sp>
+        <p:nvSpPr>
+          <p:cNvPr id="3" name="Notes Placeholder 2"/>
+          <p:cNvSpPr>
+            <a:spLocks noGrp="1"/>
+          </p:cNvSpPr>
+          <p:nvPr>
+            <p:ph type="body" idx="1"/>
+          </p:nvPr>
+        </p:nvSpPr>
+        <p:spPr/>
+        <p:txBody>
+          <a:bodyPr>
+            <a:normAutofit/>
+          </a:bodyPr>
+          <a:lstStyle/>
+          <a:p>
+            <a:pPr marL="0" marR="0" indent="0" algn="l" defTabSz="914400" rtl="0" eaLnBrk="1" fontAlgn="auto" latinLnBrk="0" hangingPunct="1">
+              <a:lnSpc>
+                <a:spcPct val="100000"/>
+              </a:lnSpc>
+              <a:spcBef>
+                <a:spcPts val="0"/>
+              </a:spcBef>
+              <a:spcAft>
+                <a:spcPts val="0"/>
+              </a:spcAft>
+              <a:buClrTx/>
+              <a:buSzTx/>
+              <a:buFontTx/>
+              <a:buNone/>
+              <a:tabLst/>
+              <a:defRPr/>
+            </a:pPr>
+            <a:r>
+              <a:rPr lang="en-US" dirty="0" smtClean="0"/>
+              <a:t>Sometimes</a:t>
+            </a:r>
+            <a:r>
+              <a:rPr lang="en-US" baseline="0" dirty="0" smtClean="0"/>
+              <a:t> it’s difficult or impossible to instantiate a class.</a:t>
+            </a:r>
+            <a:endParaRPr lang="en-US" dirty="0" smtClean="0"/>
+          </a:p>
+          <a:p>
+            <a:endParaRPr lang="en-US" dirty="0"/>
+          </a:p>
+        </p:txBody>
+      </p:sp>
+      <p:sp>
+        <p:nvSpPr>
+          <p:cNvPr id="4" name="Slide Number Placeholder 3"/>
+          <p:cNvSpPr>
+            <a:spLocks noGrp="1"/>
+          </p:cNvSpPr>
+          <p:nvPr>
+            <p:ph type="sldNum" sz="quarter" idx="10"/>
+          </p:nvPr>
+        </p:nvSpPr>
+        <p:spPr/>
+        <p:txBody>
+          <a:bodyPr/>
+          <a:lstStyle/>
+          <a:p>
+            <a:fld id="{A30BF6A9-19BC-4964-AB25-3E1076347DF9}" type="slidenum">
+              <a:rPr lang="en-US" smtClean="0"/>
+              <a:pPr/>
+              <a:t>9</a:t>
+            </a:fld>
+            <a:endParaRPr lang="en-US"/>
+          </a:p>
+        </p:txBody>
+      </p:sp>
+    </p:spTree>
+  </p:cSld>
+  <p:clrMapOvr>
+    <a:masterClrMapping/>
+  </p:clrMapOvr>
+</p:notes>
+</file>
+
+<file path=ppt/notesSlides/notesSlide5.xml><?xml version="1.0" encoding="utf-8"?>
+<p:notes xmlns:a="http://schemas.openxmlformats.org/drawingml/2006/main" xmlns:r="http://schemas.openxmlformats.org/officeDocument/2006/relationships" xmlns:p="http://schemas.openxmlformats.org/presentationml/2006/main">
+  <p:cSld>
+    <p:spTree>
+      <p:nvGrpSpPr>
+        <p:cNvPr id="1" name=""/>
+        <p:cNvGrpSpPr/>
+        <p:nvPr/>
+      </p:nvGrpSpPr>
+      <p:grpSpPr>
+        <a:xfrm>
+          <a:off x="0" y="0"/>
+          <a:ext cx="0" cy="0"/>
+          <a:chOff x="0" y="0"/>
+          <a:chExt cx="0" cy="0"/>
+        </a:xfrm>
+      </p:grpSpPr>
+      <p:sp>
+        <p:nvSpPr>
+          <p:cNvPr id="2" name="Slide Image Placeholder 1"/>
+          <p:cNvSpPr>
+            <a:spLocks noGrp="1" noRot="1" noChangeAspect="1"/>
+          </p:cNvSpPr>
+          <p:nvPr>
+            <p:ph type="sldImg"/>
+          </p:nvPr>
+        </p:nvSpPr>
+        <p:spPr/>
+      </p:sp>
+      <p:sp>
+        <p:nvSpPr>
+          <p:cNvPr id="3" name="Notes Placeholder 2"/>
+          <p:cNvSpPr>
+            <a:spLocks noGrp="1"/>
+          </p:cNvSpPr>
+          <p:nvPr>
+            <p:ph type="body" idx="1"/>
+          </p:nvPr>
+        </p:nvSpPr>
+        <p:spPr/>
+        <p:txBody>
+          <a:bodyPr>
+            <a:normAutofit/>
+          </a:bodyPr>
+          <a:lstStyle/>
+          <a:p>
+            <a:r>
+              <a:rPr lang="en-US" dirty="0" smtClean="0"/>
+              <a:t>Dependency injection</a:t>
+            </a:r>
+          </a:p>
+        </p:txBody>
+      </p:sp>
+      <p:sp>
+        <p:nvSpPr>
+          <p:cNvPr id="4" name="Slide Number Placeholder 3"/>
+          <p:cNvSpPr>
+            <a:spLocks noGrp="1"/>
+          </p:cNvSpPr>
+          <p:nvPr>
+            <p:ph type="sldNum" sz="quarter" idx="10"/>
+          </p:nvPr>
+        </p:nvSpPr>
+        <p:spPr/>
+        <p:txBody>
+          <a:bodyPr/>
+          <a:lstStyle/>
+          <a:p>
+            <a:fld id="{A30BF6A9-19BC-4964-AB25-3E1076347DF9}" type="slidenum">
+              <a:rPr lang="en-US" smtClean="0"/>
+              <a:pPr/>
+              <a:t>10</a:t>
+            </a:fld>
+            <a:endParaRPr lang="en-US"/>
+          </a:p>
+        </p:txBody>
+      </p:sp>
+    </p:spTree>
+  </p:cSld>
+  <p:clrMapOvr>
+    <a:masterClrMapping/>
+  </p:clrMapOvr>
+</p:notes>
+</file>
+
+<file path=ppt/notesSlides/notesSlide6.xml><?xml version="1.0" encoding="utf-8"?>
+<p:notes xmlns:a="http://schemas.openxmlformats.org/drawingml/2006/main" xmlns:r="http://schemas.openxmlformats.org/officeDocument/2006/relationships" xmlns:p="http://schemas.openxmlformats.org/presentationml/2006/main">
+  <p:cSld>
+    <p:spTree>
+      <p:nvGrpSpPr>
+        <p:cNvPr id="1" name=""/>
+        <p:cNvGrpSpPr/>
+        <p:nvPr/>
+      </p:nvGrpSpPr>
+      <p:grpSpPr>
+        <a:xfrm>
+          <a:off x="0" y="0"/>
+          <a:ext cx="0" cy="0"/>
+          <a:chOff x="0" y="0"/>
+          <a:chExt cx="0" cy="0"/>
+        </a:xfrm>
+      </p:grpSpPr>
+      <p:sp>
+        <p:nvSpPr>
+          <p:cNvPr id="2" name="Slide Image Placeholder 1"/>
+          <p:cNvSpPr>
+            <a:spLocks noGrp="1" noRot="1" noChangeAspect="1"/>
+          </p:cNvSpPr>
+          <p:nvPr>
+            <p:ph type="sldImg"/>
+          </p:nvPr>
+        </p:nvSpPr>
+        <p:spPr/>
+      </p:sp>
+      <p:sp>
+        <p:nvSpPr>
+          <p:cNvPr id="3" name="Notes Placeholder 2"/>
+          <p:cNvSpPr>
+            <a:spLocks noGrp="1"/>
+          </p:cNvSpPr>
+          <p:nvPr>
+            <p:ph type="body" idx="1"/>
+          </p:nvPr>
+        </p:nvSpPr>
+        <p:spPr/>
+        <p:txBody>
+          <a:bodyPr>
+            <a:normAutofit/>
+          </a:bodyPr>
+          <a:lstStyle/>
+          <a:p>
+            <a:r>
+              <a:rPr lang="en-US" dirty="0" smtClean="0"/>
+              <a:t>Here is dependency</a:t>
+            </a:r>
+            <a:r>
+              <a:rPr lang="en-US" baseline="0" dirty="0" smtClean="0"/>
+              <a:t> injection in action. </a:t>
+            </a:r>
+          </a:p>
+          <a:p>
+            <a:endParaRPr lang="en-US" baseline="0" dirty="0" smtClean="0"/>
+          </a:p>
+          <a:p>
+            <a:r>
+              <a:rPr lang="en-US" baseline="0" dirty="0" smtClean="0">
+                <a:solidFill>
+                  <a:srgbClr val="FF0000"/>
+                </a:solidFill>
+              </a:rPr>
+              <a:t>Demo without service locator.</a:t>
+            </a:r>
+          </a:p>
+          <a:p>
+            <a:endParaRPr lang="en-US" dirty="0"/>
+          </a:p>
+        </p:txBody>
+      </p:sp>
+      <p:sp>
+        <p:nvSpPr>
+          <p:cNvPr id="4" name="Slide Number Placeholder 3"/>
+          <p:cNvSpPr>
+            <a:spLocks noGrp="1"/>
+          </p:cNvSpPr>
+          <p:nvPr>
+            <p:ph type="sldNum" sz="quarter" idx="10"/>
+          </p:nvPr>
+        </p:nvSpPr>
+        <p:spPr/>
+        <p:txBody>
+          <a:bodyPr/>
+          <a:lstStyle/>
+          <a:p>
+            <a:fld id="{A30BF6A9-19BC-4964-AB25-3E1076347DF9}" type="slidenum">
+              <a:rPr lang="en-US" smtClean="0"/>
+              <a:pPr/>
+              <a:t>11</a:t>
+            </a:fld>
+            <a:endParaRPr lang="en-US"/>
+          </a:p>
+        </p:txBody>
+      </p:sp>
+    </p:spTree>
+  </p:cSld>
+  <p:clrMapOvr>
+    <a:masterClrMapping/>
+  </p:clrMapOvr>
+</p:notes>
+</file>
+
+<file path=ppt/notesSlides/notesSlide7.xml><?xml version="1.0" encoding="utf-8"?>
+<p:notes xmlns:a="http://schemas.openxmlformats.org/drawingml/2006/main" xmlns:r="http://schemas.openxmlformats.org/officeDocument/2006/relationships" xmlns:p="http://schemas.openxmlformats.org/presentationml/2006/main">
+  <p:cSld>
+    <p:spTree>
+      <p:nvGrpSpPr>
+        <p:cNvPr id="1" name=""/>
+        <p:cNvGrpSpPr/>
+        <p:nvPr/>
+      </p:nvGrpSpPr>
+      <p:grpSpPr>
+        <a:xfrm>
+          <a:off x="0" y="0"/>
+          <a:ext cx="0" cy="0"/>
+          <a:chOff x="0" y="0"/>
+          <a:chExt cx="0" cy="0"/>
+        </a:xfrm>
+      </p:grpSpPr>
+      <p:sp>
+        <p:nvSpPr>
+          <p:cNvPr id="2" name="Slide Image Placeholder 1"/>
+          <p:cNvSpPr>
+            <a:spLocks noGrp="1" noRot="1" noChangeAspect="1"/>
+          </p:cNvSpPr>
+          <p:nvPr>
+            <p:ph type="sldImg"/>
+          </p:nvPr>
+        </p:nvSpPr>
+        <p:spPr/>
+      </p:sp>
+      <p:sp>
+        <p:nvSpPr>
+          <p:cNvPr id="3" name="Notes Placeholder 2"/>
+          <p:cNvSpPr>
+            <a:spLocks noGrp="1"/>
+          </p:cNvSpPr>
+          <p:nvPr>
+            <p:ph type="body" idx="1"/>
+          </p:nvPr>
+        </p:nvSpPr>
+        <p:spPr/>
+        <p:txBody>
+          <a:bodyPr>
+            <a:normAutofit/>
+          </a:bodyPr>
+          <a:lstStyle/>
+          <a:p>
+            <a:endParaRPr lang="en-US" baseline="0" dirty="0" smtClean="0"/>
+          </a:p>
+          <a:p>
+            <a:r>
+              <a:rPr lang="en-US" baseline="0" dirty="0" smtClean="0"/>
+              <a:t>But imagine a number of classes, a number of dependencies, a million components, each with one job, one responsibility, one easily-tested role to play, all composed together to form an application:</a:t>
+            </a:r>
+            <a:endParaRPr lang="en-US" dirty="0" smtClean="0"/>
+          </a:p>
+          <a:p>
+            <a:endParaRPr lang="en-US" dirty="0"/>
+          </a:p>
+        </p:txBody>
+      </p:sp>
+      <p:sp>
+        <p:nvSpPr>
+          <p:cNvPr id="4" name="Slide Number Placeholder 3"/>
+          <p:cNvSpPr>
+            <a:spLocks noGrp="1"/>
+          </p:cNvSpPr>
+          <p:nvPr>
+            <p:ph type="sldNum" sz="quarter" idx="10"/>
+          </p:nvPr>
+        </p:nvSpPr>
+        <p:spPr/>
+        <p:txBody>
+          <a:bodyPr/>
+          <a:lstStyle/>
+          <a:p>
+            <a:fld id="{A30BF6A9-19BC-4964-AB25-3E1076347DF9}" type="slidenum">
+              <a:rPr lang="en-US" smtClean="0"/>
+              <a:pPr/>
+              <a:t>12</a:t>
+            </a:fld>
+            <a:endParaRPr lang="en-US"/>
+          </a:p>
+        </p:txBody>
+      </p:sp>
+    </p:spTree>
+  </p:cSld>
+  <p:clrMapOvr>
+    <a:masterClrMapping/>
+  </p:clrMapOvr>
+</p:notes>
+</file>
+
+<file path=ppt/notesSlides/notesSlide8.xml><?xml version="1.0" encoding="utf-8"?>
+<p:notes xmlns:a="http://schemas.openxmlformats.org/drawingml/2006/main" xmlns:r="http://schemas.openxmlformats.org/officeDocument/2006/relationships" xmlns:p="http://schemas.openxmlformats.org/presentationml/2006/main">
+  <p:cSld>
+    <p:spTree>
+      <p:nvGrpSpPr>
+        <p:cNvPr id="1" name=""/>
+        <p:cNvGrpSpPr/>
+        <p:nvPr/>
+      </p:nvGrpSpPr>
+      <p:grpSpPr>
+        <a:xfrm>
+          <a:off x="0" y="0"/>
+          <a:ext cx="0" cy="0"/>
+          <a:chOff x="0" y="0"/>
+          <a:chExt cx="0" cy="0"/>
+        </a:xfrm>
+      </p:grpSpPr>
+      <p:sp>
+        <p:nvSpPr>
+          <p:cNvPr id="2" name="Slide Image Placeholder 1"/>
+          <p:cNvSpPr>
+            <a:spLocks noGrp="1" noRot="1" noChangeAspect="1"/>
+          </p:cNvSpPr>
+          <p:nvPr>
+            <p:ph type="sldImg"/>
+          </p:nvPr>
+        </p:nvSpPr>
+        <p:spPr/>
+      </p:sp>
+      <p:sp>
+        <p:nvSpPr>
+          <p:cNvPr id="3" name="Notes Placeholder 2"/>
+          <p:cNvSpPr>
+            <a:spLocks noGrp="1"/>
+          </p:cNvSpPr>
+          <p:nvPr>
+            <p:ph type="body" idx="1"/>
+          </p:nvPr>
+        </p:nvSpPr>
+        <p:spPr/>
+        <p:txBody>
+          <a:bodyPr>
+            <a:normAutofit/>
+          </a:bodyPr>
+          <a:lstStyle/>
+          <a:p>
+            <a:r>
+              <a:rPr lang="en-US" dirty="0" smtClean="0"/>
               <a:t>Finish demo here.</a:t>
             </a:r>
             <a:endParaRPr lang="en-US" dirty="0"/>
@@ -747,7 +1503,7 @@
             <a:fld id="{2F1B85D0-A8DC-4B1B-920D-F0E34F47ADD3}" type="datetimeFigureOut">
               <a:rPr lang="en-US" smtClean="0"/>
               <a:pPr/>
-              <a:t>12/14/2009</a:t>
+              <a:t>12/15/2009</a:t>
             </a:fld>
             <a:endParaRPr lang="en-US"/>
           </a:p>
@@ -914,7 +1670,7 @@
             <a:fld id="{2F1B85D0-A8DC-4B1B-920D-F0E34F47ADD3}" type="datetimeFigureOut">
               <a:rPr lang="en-US" smtClean="0"/>
               <a:pPr/>
-              <a:t>12/14/2009</a:t>
+              <a:t>12/15/2009</a:t>
             </a:fld>
             <a:endParaRPr lang="en-US"/>
           </a:p>
@@ -1091,7 +1847,7 @@
             <a:fld id="{2F1B85D0-A8DC-4B1B-920D-F0E34F47ADD3}" type="datetimeFigureOut">
               <a:rPr lang="en-US" smtClean="0"/>
               <a:pPr/>
-              <a:t>12/14/2009</a:t>
+              <a:t>12/15/2009</a:t>
             </a:fld>
             <a:endParaRPr lang="en-US"/>
           </a:p>
@@ -1258,7 +2014,7 @@
             <a:fld id="{2F1B85D0-A8DC-4B1B-920D-F0E34F47ADD3}" type="datetimeFigureOut">
               <a:rPr lang="en-US" smtClean="0"/>
               <a:pPr/>
-              <a:t>12/14/2009</a:t>
+              <a:t>12/15/2009</a:t>
             </a:fld>
             <a:endParaRPr lang="en-US"/>
           </a:p>
@@ -1501,7 +2257,7 @@
             <a:fld id="{2F1B85D0-A8DC-4B1B-920D-F0E34F47ADD3}" type="datetimeFigureOut">
               <a:rPr lang="en-US" smtClean="0"/>
               <a:pPr/>
-              <a:t>12/14/2009</a:t>
+              <a:t>12/15/2009</a:t>
             </a:fld>
             <a:endParaRPr lang="en-US"/>
           </a:p>
@@ -1786,7 +2542,7 @@
             <a:fld id="{2F1B85D0-A8DC-4B1B-920D-F0E34F47ADD3}" type="datetimeFigureOut">
               <a:rPr lang="en-US" smtClean="0"/>
               <a:pPr/>
-              <a:t>12/14/2009</a:t>
+              <a:t>12/15/2009</a:t>
             </a:fld>
             <a:endParaRPr lang="en-US"/>
           </a:p>
@@ -2205,7 +2961,7 @@
             <a:fld id="{2F1B85D0-A8DC-4B1B-920D-F0E34F47ADD3}" type="datetimeFigureOut">
               <a:rPr lang="en-US" smtClean="0"/>
               <a:pPr/>
-              <a:t>12/14/2009</a:t>
+              <a:t>12/15/2009</a:t>
             </a:fld>
             <a:endParaRPr lang="en-US"/>
           </a:p>
@@ -2320,7 +3076,7 @@
             <a:fld id="{2F1B85D0-A8DC-4B1B-920D-F0E34F47ADD3}" type="datetimeFigureOut">
               <a:rPr lang="en-US" smtClean="0"/>
               <a:pPr/>
-              <a:t>12/14/2009</a:t>
+              <a:t>12/15/2009</a:t>
             </a:fld>
             <a:endParaRPr lang="en-US"/>
           </a:p>
@@ -2412,7 +3168,7 @@
             <a:fld id="{2F1B85D0-A8DC-4B1B-920D-F0E34F47ADD3}" type="datetimeFigureOut">
               <a:rPr lang="en-US" smtClean="0"/>
               <a:pPr/>
-              <a:t>12/14/2009</a:t>
+              <a:t>12/15/2009</a:t>
             </a:fld>
             <a:endParaRPr lang="en-US"/>
           </a:p>
@@ -2686,7 +3442,7 @@
             <a:fld id="{2F1B85D0-A8DC-4B1B-920D-F0E34F47ADD3}" type="datetimeFigureOut">
               <a:rPr lang="en-US" smtClean="0"/>
               <a:pPr/>
-              <a:t>12/14/2009</a:t>
+              <a:t>12/15/2009</a:t>
             </a:fld>
             <a:endParaRPr lang="en-US"/>
           </a:p>
@@ -2936,7 +3692,7 @@
             <a:fld id="{2F1B85D0-A8DC-4B1B-920D-F0E34F47ADD3}" type="datetimeFigureOut">
               <a:rPr lang="en-US" smtClean="0"/>
               <a:pPr/>
-              <a:t>12/14/2009</a:t>
+              <a:t>12/15/2009</a:t>
             </a:fld>
             <a:endParaRPr lang="en-US"/>
           </a:p>
@@ -3146,7 +3902,7 @@
             <a:fld id="{2F1B85D0-A8DC-4B1B-920D-F0E34F47ADD3}" type="datetimeFigureOut">
               <a:rPr lang="en-US" smtClean="0"/>
               <a:pPr/>
-              <a:t>12/14/2009</a:t>
+              <a:t>12/15/2009</a:t>
             </a:fld>
             <a:endParaRPr lang="en-US"/>
           </a:p>
@@ -3652,6 +4408,13 @@
   <p:clrMapOvr>
     <a:masterClrMapping/>
   </p:clrMapOvr>
+  <p:timing>
+    <p:tnLst>
+      <p:par>
+        <p:cTn id="1" dur="indefinite" restart="never" nodeType="tmRoot"/>
+      </p:par>
+    </p:tnLst>
+  </p:timing>
 </p:sld>
 </file>
 
@@ -3661,7 +4424,7 @@
     <p:bg>
       <p:bgPr>
         <a:blipFill dpi="0" rotWithShape="1">
-          <a:blip r:embed="rId2" cstate="print">
+          <a:blip r:embed="rId3" cstate="print">
             <a:lum/>
           </a:blip>
           <a:srcRect/>
@@ -3695,7 +4458,7 @@
           <p:nvPr/>
         </p:nvPicPr>
         <p:blipFill>
-          <a:blip r:embed="rId3" cstate="print"/>
+          <a:blip r:embed="rId4" cstate="print"/>
           <a:srcRect/>
           <a:stretch>
             <a:fillRect/>
@@ -3733,7 +4496,7 @@
     <p:bg>
       <p:bgPr>
         <a:blipFill dpi="0" rotWithShape="1">
-          <a:blip r:embed="rId2" cstate="print">
+          <a:blip r:embed="rId3" cstate="print">
             <a:lum/>
           </a:blip>
           <a:srcRect/>
@@ -3767,7 +4530,7 @@
           <p:nvPr/>
         </p:nvPicPr>
         <p:blipFill>
-          <a:blip r:embed="rId3" cstate="print"/>
+          <a:blip r:embed="rId4" cstate="print"/>
           <a:srcRect/>
           <a:stretch>
             <a:fillRect/>
@@ -3775,8 +4538,8 @@
         </p:blipFill>
         <p:spPr bwMode="auto">
           <a:xfrm>
-            <a:off x="0" y="304800"/>
-            <a:ext cx="9161877" cy="6553200"/>
+            <a:off x="0" y="990600"/>
+            <a:ext cx="9144000" cy="5238750"/>
           </a:xfrm>
           <a:prstGeom prst="rect">
             <a:avLst/>
@@ -3788,6 +4551,7 @@
             <a:headEnd/>
             <a:tailEnd/>
           </a:ln>
+          <a:effectLst/>
         </p:spPr>
       </p:pic>
     </p:spTree>
@@ -3804,7 +4568,7 @@
     <p:bg>
       <p:bgPr>
         <a:blipFill dpi="0" rotWithShape="1">
-          <a:blip r:embed="rId2" cstate="print">
+          <a:blip r:embed="rId3" cstate="print">
             <a:lum/>
           </a:blip>
           <a:srcRect/>
@@ -3838,7 +4602,7 @@
           <p:nvPr/>
         </p:nvPicPr>
         <p:blipFill>
-          <a:blip r:embed="rId3" cstate="print"/>
+          <a:blip r:embed="rId4" cstate="print"/>
           <a:srcRect/>
           <a:stretch>
             <a:fillRect/>
@@ -3846,8 +4610,8 @@
         </p:blipFill>
         <p:spPr bwMode="auto">
           <a:xfrm>
-            <a:off x="0" y="990600"/>
-            <a:ext cx="9144000" cy="5238750"/>
+            <a:off x="0" y="304800"/>
+            <a:ext cx="9161877" cy="6553200"/>
           </a:xfrm>
           <a:prstGeom prst="rect">
             <a:avLst/>
@@ -3859,7 +4623,6 @@
             <a:headEnd/>
             <a:tailEnd/>
           </a:ln>
-          <a:effectLst/>
         </p:spPr>
       </p:pic>
     </p:spTree>
@@ -4396,7 +5159,7 @@
     <p:bg>
       <p:bgPr>
         <a:blipFill dpi="0" rotWithShape="1">
-          <a:blip r:embed="rId2" cstate="print">
+          <a:blip r:embed="rId3" cstate="print">
             <a:lum/>
           </a:blip>
           <a:srcRect/>
@@ -4458,6 +5221,13 @@
   <p:clrMapOvr>
     <a:masterClrMapping/>
   </p:clrMapOvr>
+  <p:timing>
+    <p:tnLst>
+      <p:par>
+        <p:cTn id="1" dur="indefinite" restart="never" nodeType="tmRoot"/>
+      </p:par>
+    </p:tnLst>
+  </p:timing>
 </p:sld>
 </file>
 
@@ -6229,7 +6999,7 @@
     <p:bg>
       <p:bgPr>
         <a:blipFill dpi="0" rotWithShape="1">
-          <a:blip r:embed="rId2" cstate="print">
+          <a:blip r:embed="rId3" cstate="print">
             <a:lum/>
           </a:blip>
           <a:srcRect/>
@@ -6342,7 +7112,7 @@
     <p:bg>
       <p:bgPr>
         <a:blipFill dpi="0" rotWithShape="1">
-          <a:blip r:embed="rId2" cstate="print">
+          <a:blip r:embed="rId3" cstate="print">
             <a:lum/>
           </a:blip>
           <a:srcRect/>
@@ -6522,7 +7292,7 @@
     <p:bg>
       <p:bgPr>
         <a:blipFill dpi="0" rotWithShape="1">
-          <a:blip r:embed="rId2" cstate="print">
+          <a:blip r:embed="rId3" cstate="print">
             <a:lum/>
           </a:blip>
           <a:srcRect/>

</xml_diff>

<commit_message>
changed up a slide
</commit_message>
<xml_diff>
--- a/Headspring.pptx
+++ b/Headspring.pptx
@@ -215,7 +215,7 @@
             <a:fld id="{7072611E-5E6A-420E-9E03-EF7E4D75AE23}" type="datetimeFigureOut">
               <a:rPr lang="en-US" smtClean="0"/>
               <a:pPr/>
-              <a:t>12/15/2009</a:t>
+              <a:t>3/11/2010</a:t>
             </a:fld>
             <a:endParaRPr lang="en-US"/>
           </a:p>
@@ -587,7 +587,6 @@
               <a:rPr lang="en-US" baseline="0" dirty="0" smtClean="0"/>
               <a:t>Imagine you have an email sending class.. Let’s call it.. </a:t>
             </a:r>
-            <a:endParaRPr lang="en-US" baseline="0" dirty="0" smtClean="0"/>
           </a:p>
         </p:txBody>
       </p:sp>
@@ -1503,7 +1502,7 @@
             <a:fld id="{2F1B85D0-A8DC-4B1B-920D-F0E34F47ADD3}" type="datetimeFigureOut">
               <a:rPr lang="en-US" smtClean="0"/>
               <a:pPr/>
-              <a:t>12/15/2009</a:t>
+              <a:t>3/11/2010</a:t>
             </a:fld>
             <a:endParaRPr lang="en-US"/>
           </a:p>
@@ -1670,7 +1669,7 @@
             <a:fld id="{2F1B85D0-A8DC-4B1B-920D-F0E34F47ADD3}" type="datetimeFigureOut">
               <a:rPr lang="en-US" smtClean="0"/>
               <a:pPr/>
-              <a:t>12/15/2009</a:t>
+              <a:t>3/11/2010</a:t>
             </a:fld>
             <a:endParaRPr lang="en-US"/>
           </a:p>
@@ -1847,7 +1846,7 @@
             <a:fld id="{2F1B85D0-A8DC-4B1B-920D-F0E34F47ADD3}" type="datetimeFigureOut">
               <a:rPr lang="en-US" smtClean="0"/>
               <a:pPr/>
-              <a:t>12/15/2009</a:t>
+              <a:t>3/11/2010</a:t>
             </a:fld>
             <a:endParaRPr lang="en-US"/>
           </a:p>
@@ -2014,7 +2013,7 @@
             <a:fld id="{2F1B85D0-A8DC-4B1B-920D-F0E34F47ADD3}" type="datetimeFigureOut">
               <a:rPr lang="en-US" smtClean="0"/>
               <a:pPr/>
-              <a:t>12/15/2009</a:t>
+              <a:t>3/11/2010</a:t>
             </a:fld>
             <a:endParaRPr lang="en-US"/>
           </a:p>
@@ -2257,7 +2256,7 @@
             <a:fld id="{2F1B85D0-A8DC-4B1B-920D-F0E34F47ADD3}" type="datetimeFigureOut">
               <a:rPr lang="en-US" smtClean="0"/>
               <a:pPr/>
-              <a:t>12/15/2009</a:t>
+              <a:t>3/11/2010</a:t>
             </a:fld>
             <a:endParaRPr lang="en-US"/>
           </a:p>
@@ -2542,7 +2541,7 @@
             <a:fld id="{2F1B85D0-A8DC-4B1B-920D-F0E34F47ADD3}" type="datetimeFigureOut">
               <a:rPr lang="en-US" smtClean="0"/>
               <a:pPr/>
-              <a:t>12/15/2009</a:t>
+              <a:t>3/11/2010</a:t>
             </a:fld>
             <a:endParaRPr lang="en-US"/>
           </a:p>
@@ -2961,7 +2960,7 @@
             <a:fld id="{2F1B85D0-A8DC-4B1B-920D-F0E34F47ADD3}" type="datetimeFigureOut">
               <a:rPr lang="en-US" smtClean="0"/>
               <a:pPr/>
-              <a:t>12/15/2009</a:t>
+              <a:t>3/11/2010</a:t>
             </a:fld>
             <a:endParaRPr lang="en-US"/>
           </a:p>
@@ -3076,7 +3075,7 @@
             <a:fld id="{2F1B85D0-A8DC-4B1B-920D-F0E34F47ADD3}" type="datetimeFigureOut">
               <a:rPr lang="en-US" smtClean="0"/>
               <a:pPr/>
-              <a:t>12/15/2009</a:t>
+              <a:t>3/11/2010</a:t>
             </a:fld>
             <a:endParaRPr lang="en-US"/>
           </a:p>
@@ -3168,7 +3167,7 @@
             <a:fld id="{2F1B85D0-A8DC-4B1B-920D-F0E34F47ADD3}" type="datetimeFigureOut">
               <a:rPr lang="en-US" smtClean="0"/>
               <a:pPr/>
-              <a:t>12/15/2009</a:t>
+              <a:t>3/11/2010</a:t>
             </a:fld>
             <a:endParaRPr lang="en-US"/>
           </a:p>
@@ -3442,7 +3441,7 @@
             <a:fld id="{2F1B85D0-A8DC-4B1B-920D-F0E34F47ADD3}" type="datetimeFigureOut">
               <a:rPr lang="en-US" smtClean="0"/>
               <a:pPr/>
-              <a:t>12/15/2009</a:t>
+              <a:t>3/11/2010</a:t>
             </a:fld>
             <a:endParaRPr lang="en-US"/>
           </a:p>
@@ -3692,7 +3691,7 @@
             <a:fld id="{2F1B85D0-A8DC-4B1B-920D-F0E34F47ADD3}" type="datetimeFigureOut">
               <a:rPr lang="en-US" smtClean="0"/>
               <a:pPr/>
-              <a:t>12/15/2009</a:t>
+              <a:t>3/11/2010</a:t>
             </a:fld>
             <a:endParaRPr lang="en-US"/>
           </a:p>
@@ -3902,7 +3901,7 @@
             <a:fld id="{2F1B85D0-A8DC-4B1B-920D-F0E34F47ADD3}" type="datetimeFigureOut">
               <a:rPr lang="en-US" smtClean="0"/>
               <a:pPr/>
-              <a:t>12/15/2009</a:t>
+              <a:t>3/11/2010</a:t>
             </a:fld>
             <a:endParaRPr lang="en-US"/>
           </a:p>
@@ -5373,7 +5372,7 @@
               <a:defRPr/>
             </a:pPr>
             <a:r>
-              <a:rPr kumimoji="0" lang="en-US" sz="3200" b="0" i="0" u="none" strike="noStrike" kern="1200" cap="none" spc="0" normalizeH="0" baseline="0" noProof="0" smtClean="0">
+              <a:rPr kumimoji="0" lang="en-US" sz="4000" b="0" i="0" u="none" strike="noStrike" kern="1200" cap="none" spc="0" normalizeH="0" baseline="0" noProof="0" dirty="0" smtClean="0">
                 <a:ln>
                   <a:noFill/>
                 </a:ln>
@@ -5387,8 +5386,41 @@
                 <a:ea typeface="+mn-ea"/>
                 <a:cs typeface="+mn-cs"/>
               </a:rPr>
-              <a:t>Testing</a:t>
-            </a:r>
+              <a:t>Testable &amp; TDD</a:t>
+            </a:r>
+            <a:r>
+              <a:rPr lang="en-US" sz="4000" dirty="0" smtClean="0"/>
+              <a:t>-friendly</a:t>
+            </a:r>
+            <a:endParaRPr kumimoji="0" lang="en-US" sz="4000" b="0" i="0" u="none" strike="noStrike" kern="1200" cap="none" spc="0" normalizeH="0" baseline="0" noProof="0" dirty="0" smtClean="0">
+              <a:ln>
+                <a:noFill/>
+              </a:ln>
+              <a:solidFill>
+                <a:schemeClr val="tx1"/>
+              </a:solidFill>
+              <a:effectLst/>
+              <a:uLnTx/>
+              <a:uFillTx/>
+              <a:latin typeface="+mn-lt"/>
+              <a:ea typeface="+mn-ea"/>
+              <a:cs typeface="+mn-cs"/>
+            </a:endParaRPr>
+          </a:p>
+          <a:p>
+            <a:pPr marL="342900" indent="-342900">
+              <a:spcBef>
+                <a:spcPct val="20000"/>
+              </a:spcBef>
+              <a:buFont typeface="Arial" pitchFamily="34" charset="0"/>
+              <a:buChar char="•"/>
+              <a:defRPr/>
+            </a:pPr>
+            <a:r>
+              <a:rPr lang="en-US" sz="4000" dirty="0" smtClean="0"/>
+              <a:t>Simplicity</a:t>
+            </a:r>
+            <a:endParaRPr lang="en-US" sz="4000" dirty="0" smtClean="0"/>
           </a:p>
           <a:p>
             <a:pPr marL="342900" marR="0" lvl="0" indent="-342900" algn="l" defTabSz="914400" rtl="0" eaLnBrk="1" fontAlgn="auto" latinLnBrk="0" hangingPunct="1">
@@ -5409,7 +5441,7 @@
               <a:defRPr/>
             </a:pPr>
             <a:r>
-              <a:rPr kumimoji="0" lang="en-US" sz="3200" b="0" i="0" u="none" strike="noStrike" kern="1200" cap="none" spc="0" normalizeH="0" baseline="0" noProof="0" smtClean="0">
+              <a:rPr kumimoji="0" lang="en-US" sz="4000" b="0" i="0" u="none" strike="noStrike" kern="1200" cap="none" spc="0" normalizeH="0" baseline="0" noProof="0" dirty="0" smtClean="0">
                 <a:ln>
                   <a:noFill/>
                 </a:ln>
@@ -5423,8 +5455,140 @@
                 <a:ea typeface="+mn-ea"/>
                 <a:cs typeface="+mn-cs"/>
               </a:rPr>
-              <a:t>Reuse</a:t>
-            </a:r>
+              <a:t>Reuse &amp; DRY</a:t>
+            </a:r>
+            <a:endParaRPr kumimoji="0" lang="en-US" sz="4000" b="0" i="0" u="none" strike="noStrike" kern="1200" cap="none" spc="0" normalizeH="0" baseline="0" noProof="0" dirty="0" smtClean="0">
+              <a:ln>
+                <a:noFill/>
+              </a:ln>
+              <a:solidFill>
+                <a:schemeClr val="tx1"/>
+              </a:solidFill>
+              <a:effectLst/>
+              <a:uLnTx/>
+              <a:uFillTx/>
+              <a:latin typeface="+mn-lt"/>
+              <a:ea typeface="+mn-ea"/>
+              <a:cs typeface="+mn-cs"/>
+            </a:endParaRPr>
+          </a:p>
+          <a:p>
+            <a:pPr marL="342900" marR="0" lvl="0" indent="-342900" algn="l" defTabSz="914400" rtl="0" eaLnBrk="1" fontAlgn="auto" latinLnBrk="0" hangingPunct="1">
+              <a:lnSpc>
+                <a:spcPct val="100000"/>
+              </a:lnSpc>
+              <a:spcBef>
+                <a:spcPct val="20000"/>
+              </a:spcBef>
+              <a:spcAft>
+                <a:spcPts val="0"/>
+              </a:spcAft>
+              <a:buClrTx/>
+              <a:buSzTx/>
+              <a:tabLst/>
+              <a:defRPr/>
+            </a:pPr>
+            <a:endParaRPr lang="en-US" sz="4000" dirty="0" smtClean="0"/>
+          </a:p>
+          <a:p>
+            <a:pPr marL="342900" marR="0" lvl="0" indent="-342900" algn="l" defTabSz="914400" rtl="0" eaLnBrk="1" fontAlgn="auto" latinLnBrk="0" hangingPunct="1">
+              <a:lnSpc>
+                <a:spcPct val="100000"/>
+              </a:lnSpc>
+              <a:spcBef>
+                <a:spcPct val="20000"/>
+              </a:spcBef>
+              <a:spcAft>
+                <a:spcPts val="0"/>
+              </a:spcAft>
+              <a:buClrTx/>
+              <a:buSzTx/>
+              <a:tabLst/>
+              <a:defRPr/>
+            </a:pPr>
+            <a:r>
+              <a:rPr lang="en-US" sz="4000" dirty="0" smtClean="0"/>
+              <a:t>All roads lead to c</a:t>
+            </a:r>
+            <a:r>
+              <a:rPr kumimoji="0" lang="en-US" sz="4000" b="0" i="0" u="none" strike="noStrike" kern="1200" cap="none" spc="0" normalizeH="0" baseline="0" noProof="0" dirty="0" err="1" smtClean="0">
+                <a:ln>
+                  <a:noFill/>
+                </a:ln>
+                <a:solidFill>
+                  <a:schemeClr val="tx1"/>
+                </a:solidFill>
+                <a:effectLst/>
+                <a:uLnTx/>
+                <a:uFillTx/>
+                <a:latin typeface="+mn-lt"/>
+                <a:ea typeface="+mn-ea"/>
+                <a:cs typeface="+mn-cs"/>
+              </a:rPr>
+              <a:t>onstruction</a:t>
+            </a:r>
+            <a:r>
+              <a:rPr kumimoji="0" lang="en-US" sz="4000" b="0" i="0" u="none" strike="noStrike" kern="1200" cap="none" spc="0" normalizeH="0" baseline="0" noProof="0" dirty="0" smtClean="0">
+                <a:ln>
+                  <a:noFill/>
+                </a:ln>
+                <a:solidFill>
+                  <a:schemeClr val="tx1"/>
+                </a:solidFill>
+                <a:effectLst/>
+                <a:uLnTx/>
+                <a:uFillTx/>
+                <a:latin typeface="+mn-lt"/>
+                <a:ea typeface="+mn-ea"/>
+                <a:cs typeface="+mn-cs"/>
+              </a:rPr>
+              <a:t> velocity</a:t>
+            </a:r>
+            <a:endParaRPr kumimoji="0" lang="en-US" sz="4000" b="0" i="0" u="none" strike="noStrike" kern="1200" cap="none" spc="0" normalizeH="0" baseline="0" noProof="0" dirty="0" smtClean="0">
+              <a:ln>
+                <a:noFill/>
+              </a:ln>
+              <a:solidFill>
+                <a:schemeClr val="tx1"/>
+              </a:solidFill>
+              <a:effectLst/>
+              <a:uLnTx/>
+              <a:uFillTx/>
+              <a:latin typeface="+mn-lt"/>
+              <a:ea typeface="+mn-ea"/>
+              <a:cs typeface="+mn-cs"/>
+            </a:endParaRPr>
+          </a:p>
+          <a:p>
+            <a:pPr marL="342900" marR="0" lvl="0" indent="-342900" algn="l" defTabSz="914400" rtl="0" eaLnBrk="1" fontAlgn="auto" latinLnBrk="0" hangingPunct="1">
+              <a:lnSpc>
+                <a:spcPct val="100000"/>
+              </a:lnSpc>
+              <a:spcBef>
+                <a:spcPct val="20000"/>
+              </a:spcBef>
+              <a:spcAft>
+                <a:spcPts val="0"/>
+              </a:spcAft>
+              <a:buClrTx/>
+              <a:buSzTx/>
+              <a:tabLst/>
+              <a:defRPr/>
+            </a:pPr>
+            <a:endParaRPr kumimoji="0" lang="en-US" sz="3200" b="0" i="0" u="none" strike="noStrike" kern="1200" cap="none" spc="0" normalizeH="0" baseline="0" noProof="0" dirty="0" smtClean="0">
+              <a:ln>
+                <a:noFill/>
+              </a:ln>
+              <a:solidFill>
+                <a:schemeClr val="tx1"/>
+              </a:solidFill>
+              <a:effectLst/>
+              <a:uLnTx/>
+              <a:uFillTx/>
+              <a:latin typeface="+mn-lt"/>
+              <a:ea typeface="+mn-ea"/>
+              <a:cs typeface="+mn-cs"/>
+            </a:endParaRPr>
           </a:p>
           <a:p>
             <a:pPr marL="342900" marR="0" lvl="0" indent="-342900" algn="l" defTabSz="914400" rtl="0" eaLnBrk="1" fontAlgn="auto" latinLnBrk="0" hangingPunct="1">
@@ -5444,148 +5608,7 @@
               <a:tabLst/>
               <a:defRPr/>
             </a:pPr>
-            <a:r>
-              <a:rPr kumimoji="0" lang="en-US" sz="3200" b="0" i="0" u="none" strike="noStrike" kern="1200" cap="none" spc="0" normalizeH="0" baseline="0" noProof="0" smtClean="0">
-                <a:ln>
-                  <a:noFill/>
-                </a:ln>
-                <a:solidFill>
-                  <a:schemeClr val="tx1"/>
-                </a:solidFill>
-                <a:effectLst/>
-                <a:uLnTx/>
-                <a:uFillTx/>
-                <a:latin typeface="+mn-lt"/>
-                <a:ea typeface="+mn-ea"/>
-                <a:cs typeface="+mn-cs"/>
-              </a:rPr>
-              <a:t>Simplicity</a:t>
-            </a:r>
-          </a:p>
-          <a:p>
-            <a:pPr marL="342900" marR="0" lvl="0" indent="-342900" algn="l" defTabSz="914400" rtl="0" eaLnBrk="1" fontAlgn="auto" latinLnBrk="0" hangingPunct="1">
-              <a:lnSpc>
-                <a:spcPct val="100000"/>
-              </a:lnSpc>
-              <a:spcBef>
-                <a:spcPct val="20000"/>
-              </a:spcBef>
-              <a:spcAft>
-                <a:spcPts val="0"/>
-              </a:spcAft>
-              <a:buClrTx/>
-              <a:buSzTx/>
-              <a:buFont typeface="Arial" pitchFamily="34" charset="0"/>
-              <a:buChar char="•"/>
-              <a:tabLst/>
-              <a:defRPr/>
-            </a:pPr>
-            <a:r>
-              <a:rPr kumimoji="0" lang="en-US" sz="3200" b="0" i="0" u="none" strike="noStrike" kern="1200" cap="none" spc="0" normalizeH="0" baseline="0" noProof="0" smtClean="0">
-                <a:ln>
-                  <a:noFill/>
-                </a:ln>
-                <a:solidFill>
-                  <a:schemeClr val="tx1"/>
-                </a:solidFill>
-                <a:effectLst/>
-                <a:uLnTx/>
-                <a:uFillTx/>
-                <a:latin typeface="+mn-lt"/>
-                <a:ea typeface="+mn-ea"/>
-                <a:cs typeface="+mn-cs"/>
-              </a:rPr>
-              <a:t>Construction velocity</a:t>
-            </a:r>
-          </a:p>
-          <a:p>
-            <a:pPr marL="342900" marR="0" lvl="0" indent="-342900" algn="l" defTabSz="914400" rtl="0" eaLnBrk="1" fontAlgn="auto" latinLnBrk="0" hangingPunct="1">
-              <a:lnSpc>
-                <a:spcPct val="100000"/>
-              </a:lnSpc>
-              <a:spcBef>
-                <a:spcPct val="20000"/>
-              </a:spcBef>
-              <a:spcAft>
-                <a:spcPts val="0"/>
-              </a:spcAft>
-              <a:buClrTx/>
-              <a:buSzTx/>
-              <a:buFont typeface="Arial" pitchFamily="34" charset="0"/>
-              <a:buChar char="•"/>
-              <a:tabLst/>
-              <a:defRPr/>
-            </a:pPr>
-            <a:r>
-              <a:rPr kumimoji="0" lang="en-US" sz="3200" b="0" i="0" u="none" strike="noStrike" kern="1200" cap="none" spc="0" normalizeH="0" baseline="0" noProof="0" smtClean="0">
-                <a:ln>
-                  <a:noFill/>
-                </a:ln>
-                <a:solidFill>
-                  <a:schemeClr val="tx1"/>
-                </a:solidFill>
-                <a:effectLst/>
-                <a:uLnTx/>
-                <a:uFillTx/>
-                <a:latin typeface="+mn-lt"/>
-                <a:ea typeface="+mn-ea"/>
-                <a:cs typeface="+mn-cs"/>
-              </a:rPr>
-              <a:t>Fun</a:t>
-            </a:r>
-          </a:p>
-          <a:p>
-            <a:pPr marL="342900" marR="0" lvl="0" indent="-342900" algn="l" defTabSz="914400" rtl="0" eaLnBrk="1" fontAlgn="auto" latinLnBrk="0" hangingPunct="1">
-              <a:lnSpc>
-                <a:spcPct val="100000"/>
-              </a:lnSpc>
-              <a:spcBef>
-                <a:spcPct val="20000"/>
-              </a:spcBef>
-              <a:spcAft>
-                <a:spcPts val="0"/>
-              </a:spcAft>
-              <a:buClrTx/>
-              <a:buSzTx/>
-              <a:buFont typeface="Arial" pitchFamily="34" charset="0"/>
-              <a:buChar char="•"/>
-              <a:tabLst/>
-              <a:defRPr/>
-            </a:pPr>
-            <a:endParaRPr kumimoji="0" lang="en-US" sz="3200" b="0" i="0" u="none" strike="noStrike" kern="1200" cap="none" spc="0" normalizeH="0" baseline="0" noProof="0" smtClean="0">
-              <a:ln>
-                <a:noFill/>
-              </a:ln>
-              <a:solidFill>
-                <a:schemeClr val="tx1"/>
-              </a:solidFill>
-              <a:effectLst/>
-              <a:uLnTx/>
-              <a:uFillTx/>
-              <a:latin typeface="+mn-lt"/>
-              <a:ea typeface="+mn-ea"/>
-              <a:cs typeface="+mn-cs"/>
-            </a:endParaRPr>
-          </a:p>
-          <a:p>
-            <a:pPr marL="342900" marR="0" lvl="0" indent="-342900" algn="l" defTabSz="914400" rtl="0" eaLnBrk="1" fontAlgn="auto" latinLnBrk="0" hangingPunct="1">
-              <a:lnSpc>
-                <a:spcPct val="100000"/>
-              </a:lnSpc>
-              <a:spcBef>
-                <a:spcPct val="20000"/>
-              </a:spcBef>
-              <a:spcAft>
-                <a:spcPts val="0"/>
-              </a:spcAft>
-              <a:buClrTx/>
-              <a:buSzTx/>
-              <a:buFont typeface="Arial" pitchFamily="34" charset="0"/>
-              <a:buChar char="•"/>
-              <a:tabLst/>
-              <a:defRPr/>
-            </a:pPr>
-            <a:endParaRPr kumimoji="0" lang="en-US" sz="3200" b="0" i="0" u="none" strike="noStrike" kern="1200" cap="none" spc="0" normalizeH="0" baseline="0" noProof="0" smtClean="0">
+            <a:endParaRPr kumimoji="0" lang="en-US" sz="3200" b="0" i="0" u="none" strike="noStrike" kern="1200" cap="none" spc="0" normalizeH="0" baseline="0" noProof="0" dirty="0" smtClean="0">
               <a:ln>
                 <a:noFill/>
               </a:ln>

</xml_diff>

<commit_message>
Revert "changed up a slide"
This reverts commit a52b5b4729d0b435600de000cba9eaa8415170d3.
</commit_message>
<xml_diff>
--- a/Headspring.pptx
+++ b/Headspring.pptx
@@ -215,7 +215,7 @@
             <a:fld id="{7072611E-5E6A-420E-9E03-EF7E4D75AE23}" type="datetimeFigureOut">
               <a:rPr lang="en-US" smtClean="0"/>
               <a:pPr/>
-              <a:t>3/11/2010</a:t>
+              <a:t>12/15/2009</a:t>
             </a:fld>
             <a:endParaRPr lang="en-US"/>
           </a:p>
@@ -587,6 +587,7 @@
               <a:rPr lang="en-US" baseline="0" dirty="0" smtClean="0"/>
               <a:t>Imagine you have an email sending class.. Let’s call it.. </a:t>
             </a:r>
+            <a:endParaRPr lang="en-US" baseline="0" dirty="0" smtClean="0"/>
           </a:p>
         </p:txBody>
       </p:sp>
@@ -1502,7 +1503,7 @@
             <a:fld id="{2F1B85D0-A8DC-4B1B-920D-F0E34F47ADD3}" type="datetimeFigureOut">
               <a:rPr lang="en-US" smtClean="0"/>
               <a:pPr/>
-              <a:t>3/11/2010</a:t>
+              <a:t>12/15/2009</a:t>
             </a:fld>
             <a:endParaRPr lang="en-US"/>
           </a:p>
@@ -1669,7 +1670,7 @@
             <a:fld id="{2F1B85D0-A8DC-4B1B-920D-F0E34F47ADD3}" type="datetimeFigureOut">
               <a:rPr lang="en-US" smtClean="0"/>
               <a:pPr/>
-              <a:t>3/11/2010</a:t>
+              <a:t>12/15/2009</a:t>
             </a:fld>
             <a:endParaRPr lang="en-US"/>
           </a:p>
@@ -1846,7 +1847,7 @@
             <a:fld id="{2F1B85D0-A8DC-4B1B-920D-F0E34F47ADD3}" type="datetimeFigureOut">
               <a:rPr lang="en-US" smtClean="0"/>
               <a:pPr/>
-              <a:t>3/11/2010</a:t>
+              <a:t>12/15/2009</a:t>
             </a:fld>
             <a:endParaRPr lang="en-US"/>
           </a:p>
@@ -2013,7 +2014,7 @@
             <a:fld id="{2F1B85D0-A8DC-4B1B-920D-F0E34F47ADD3}" type="datetimeFigureOut">
               <a:rPr lang="en-US" smtClean="0"/>
               <a:pPr/>
-              <a:t>3/11/2010</a:t>
+              <a:t>12/15/2009</a:t>
             </a:fld>
             <a:endParaRPr lang="en-US"/>
           </a:p>
@@ -2256,7 +2257,7 @@
             <a:fld id="{2F1B85D0-A8DC-4B1B-920D-F0E34F47ADD3}" type="datetimeFigureOut">
               <a:rPr lang="en-US" smtClean="0"/>
               <a:pPr/>
-              <a:t>3/11/2010</a:t>
+              <a:t>12/15/2009</a:t>
             </a:fld>
             <a:endParaRPr lang="en-US"/>
           </a:p>
@@ -2541,7 +2542,7 @@
             <a:fld id="{2F1B85D0-A8DC-4B1B-920D-F0E34F47ADD3}" type="datetimeFigureOut">
               <a:rPr lang="en-US" smtClean="0"/>
               <a:pPr/>
-              <a:t>3/11/2010</a:t>
+              <a:t>12/15/2009</a:t>
             </a:fld>
             <a:endParaRPr lang="en-US"/>
           </a:p>
@@ -2960,7 +2961,7 @@
             <a:fld id="{2F1B85D0-A8DC-4B1B-920D-F0E34F47ADD3}" type="datetimeFigureOut">
               <a:rPr lang="en-US" smtClean="0"/>
               <a:pPr/>
-              <a:t>3/11/2010</a:t>
+              <a:t>12/15/2009</a:t>
             </a:fld>
             <a:endParaRPr lang="en-US"/>
           </a:p>
@@ -3075,7 +3076,7 @@
             <a:fld id="{2F1B85D0-A8DC-4B1B-920D-F0E34F47ADD3}" type="datetimeFigureOut">
               <a:rPr lang="en-US" smtClean="0"/>
               <a:pPr/>
-              <a:t>3/11/2010</a:t>
+              <a:t>12/15/2009</a:t>
             </a:fld>
             <a:endParaRPr lang="en-US"/>
           </a:p>
@@ -3167,7 +3168,7 @@
             <a:fld id="{2F1B85D0-A8DC-4B1B-920D-F0E34F47ADD3}" type="datetimeFigureOut">
               <a:rPr lang="en-US" smtClean="0"/>
               <a:pPr/>
-              <a:t>3/11/2010</a:t>
+              <a:t>12/15/2009</a:t>
             </a:fld>
             <a:endParaRPr lang="en-US"/>
           </a:p>
@@ -3441,7 +3442,7 @@
             <a:fld id="{2F1B85D0-A8DC-4B1B-920D-F0E34F47ADD3}" type="datetimeFigureOut">
               <a:rPr lang="en-US" smtClean="0"/>
               <a:pPr/>
-              <a:t>3/11/2010</a:t>
+              <a:t>12/15/2009</a:t>
             </a:fld>
             <a:endParaRPr lang="en-US"/>
           </a:p>
@@ -3691,7 +3692,7 @@
             <a:fld id="{2F1B85D0-A8DC-4B1B-920D-F0E34F47ADD3}" type="datetimeFigureOut">
               <a:rPr lang="en-US" smtClean="0"/>
               <a:pPr/>
-              <a:t>3/11/2010</a:t>
+              <a:t>12/15/2009</a:t>
             </a:fld>
             <a:endParaRPr lang="en-US"/>
           </a:p>
@@ -3901,7 +3902,7 @@
             <a:fld id="{2F1B85D0-A8DC-4B1B-920D-F0E34F47ADD3}" type="datetimeFigureOut">
               <a:rPr lang="en-US" smtClean="0"/>
               <a:pPr/>
-              <a:t>3/11/2010</a:t>
+              <a:t>12/15/2009</a:t>
             </a:fld>
             <a:endParaRPr lang="en-US"/>
           </a:p>
@@ -5372,7 +5373,7 @@
               <a:defRPr/>
             </a:pPr>
             <a:r>
-              <a:rPr kumimoji="0" lang="en-US" sz="4000" b="0" i="0" u="none" strike="noStrike" kern="1200" cap="none" spc="0" normalizeH="0" baseline="0" noProof="0" dirty="0" smtClean="0">
+              <a:rPr kumimoji="0" lang="en-US" sz="3200" b="0" i="0" u="none" strike="noStrike" kern="1200" cap="none" spc="0" normalizeH="0" baseline="0" noProof="0" smtClean="0">
                 <a:ln>
                   <a:noFill/>
                 </a:ln>
@@ -5386,41 +5387,8 @@
                 <a:ea typeface="+mn-ea"/>
                 <a:cs typeface="+mn-cs"/>
               </a:rPr>
-              <a:t>Testable &amp; TDD</a:t>
-            </a:r>
-            <a:r>
-              <a:rPr lang="en-US" sz="4000" dirty="0" smtClean="0"/>
-              <a:t>-friendly</a:t>
-            </a:r>
-            <a:endParaRPr kumimoji="0" lang="en-US" sz="4000" b="0" i="0" u="none" strike="noStrike" kern="1200" cap="none" spc="0" normalizeH="0" baseline="0" noProof="0" dirty="0" smtClean="0">
-              <a:ln>
-                <a:noFill/>
-              </a:ln>
-              <a:solidFill>
-                <a:schemeClr val="tx1"/>
-              </a:solidFill>
-              <a:effectLst/>
-              <a:uLnTx/>
-              <a:uFillTx/>
-              <a:latin typeface="+mn-lt"/>
-              <a:ea typeface="+mn-ea"/>
-              <a:cs typeface="+mn-cs"/>
-            </a:endParaRPr>
-          </a:p>
-          <a:p>
-            <a:pPr marL="342900" indent="-342900">
-              <a:spcBef>
-                <a:spcPct val="20000"/>
-              </a:spcBef>
-              <a:buFont typeface="Arial" pitchFamily="34" charset="0"/>
-              <a:buChar char="•"/>
-              <a:defRPr/>
-            </a:pPr>
-            <a:r>
-              <a:rPr lang="en-US" sz="4000" dirty="0" smtClean="0"/>
-              <a:t>Simplicity</a:t>
-            </a:r>
-            <a:endParaRPr lang="en-US" sz="4000" dirty="0" smtClean="0"/>
+              <a:t>Testing</a:t>
+            </a:r>
           </a:p>
           <a:p>
             <a:pPr marL="342900" marR="0" lvl="0" indent="-342900" algn="l" defTabSz="914400" rtl="0" eaLnBrk="1" fontAlgn="auto" latinLnBrk="0" hangingPunct="1">
@@ -5441,7 +5409,7 @@
               <a:defRPr/>
             </a:pPr>
             <a:r>
-              <a:rPr kumimoji="0" lang="en-US" sz="4000" b="0" i="0" u="none" strike="noStrike" kern="1200" cap="none" spc="0" normalizeH="0" baseline="0" noProof="0" dirty="0" smtClean="0">
+              <a:rPr kumimoji="0" lang="en-US" sz="3200" b="0" i="0" u="none" strike="noStrike" kern="1200" cap="none" spc="0" normalizeH="0" baseline="0" noProof="0" smtClean="0">
                 <a:ln>
                   <a:noFill/>
                 </a:ln>
@@ -5455,140 +5423,8 @@
                 <a:ea typeface="+mn-ea"/>
                 <a:cs typeface="+mn-cs"/>
               </a:rPr>
-              <a:t>Reuse &amp; DRY</a:t>
-            </a:r>
-            <a:endParaRPr kumimoji="0" lang="en-US" sz="4000" b="0" i="0" u="none" strike="noStrike" kern="1200" cap="none" spc="0" normalizeH="0" baseline="0" noProof="0" dirty="0" smtClean="0">
-              <a:ln>
-                <a:noFill/>
-              </a:ln>
-              <a:solidFill>
-                <a:schemeClr val="tx1"/>
-              </a:solidFill>
-              <a:effectLst/>
-              <a:uLnTx/>
-              <a:uFillTx/>
-              <a:latin typeface="+mn-lt"/>
-              <a:ea typeface="+mn-ea"/>
-              <a:cs typeface="+mn-cs"/>
-            </a:endParaRPr>
-          </a:p>
-          <a:p>
-            <a:pPr marL="342900" marR="0" lvl="0" indent="-342900" algn="l" defTabSz="914400" rtl="0" eaLnBrk="1" fontAlgn="auto" latinLnBrk="0" hangingPunct="1">
-              <a:lnSpc>
-                <a:spcPct val="100000"/>
-              </a:lnSpc>
-              <a:spcBef>
-                <a:spcPct val="20000"/>
-              </a:spcBef>
-              <a:spcAft>
-                <a:spcPts val="0"/>
-              </a:spcAft>
-              <a:buClrTx/>
-              <a:buSzTx/>
-              <a:tabLst/>
-              <a:defRPr/>
-            </a:pPr>
-            <a:endParaRPr lang="en-US" sz="4000" dirty="0" smtClean="0"/>
-          </a:p>
-          <a:p>
-            <a:pPr marL="342900" marR="0" lvl="0" indent="-342900" algn="l" defTabSz="914400" rtl="0" eaLnBrk="1" fontAlgn="auto" latinLnBrk="0" hangingPunct="1">
-              <a:lnSpc>
-                <a:spcPct val="100000"/>
-              </a:lnSpc>
-              <a:spcBef>
-                <a:spcPct val="20000"/>
-              </a:spcBef>
-              <a:spcAft>
-                <a:spcPts val="0"/>
-              </a:spcAft>
-              <a:buClrTx/>
-              <a:buSzTx/>
-              <a:tabLst/>
-              <a:defRPr/>
-            </a:pPr>
-            <a:r>
-              <a:rPr lang="en-US" sz="4000" dirty="0" smtClean="0"/>
-              <a:t>All roads lead to c</a:t>
-            </a:r>
-            <a:r>
-              <a:rPr kumimoji="0" lang="en-US" sz="4000" b="0" i="0" u="none" strike="noStrike" kern="1200" cap="none" spc="0" normalizeH="0" baseline="0" noProof="0" dirty="0" err="1" smtClean="0">
-                <a:ln>
-                  <a:noFill/>
-                </a:ln>
-                <a:solidFill>
-                  <a:schemeClr val="tx1"/>
-                </a:solidFill>
-                <a:effectLst/>
-                <a:uLnTx/>
-                <a:uFillTx/>
-                <a:latin typeface="+mn-lt"/>
-                <a:ea typeface="+mn-ea"/>
-                <a:cs typeface="+mn-cs"/>
-              </a:rPr>
-              <a:t>onstruction</a:t>
-            </a:r>
-            <a:r>
-              <a:rPr kumimoji="0" lang="en-US" sz="4000" b="0" i="0" u="none" strike="noStrike" kern="1200" cap="none" spc="0" normalizeH="0" baseline="0" noProof="0" dirty="0" smtClean="0">
-                <a:ln>
-                  <a:noFill/>
-                </a:ln>
-                <a:solidFill>
-                  <a:schemeClr val="tx1"/>
-                </a:solidFill>
-                <a:effectLst/>
-                <a:uLnTx/>
-                <a:uFillTx/>
-                <a:latin typeface="+mn-lt"/>
-                <a:ea typeface="+mn-ea"/>
-                <a:cs typeface="+mn-cs"/>
-              </a:rPr>
-              <a:t> velocity</a:t>
-            </a:r>
-            <a:endParaRPr kumimoji="0" lang="en-US" sz="4000" b="0" i="0" u="none" strike="noStrike" kern="1200" cap="none" spc="0" normalizeH="0" baseline="0" noProof="0" dirty="0" smtClean="0">
-              <a:ln>
-                <a:noFill/>
-              </a:ln>
-              <a:solidFill>
-                <a:schemeClr val="tx1"/>
-              </a:solidFill>
-              <a:effectLst/>
-              <a:uLnTx/>
-              <a:uFillTx/>
-              <a:latin typeface="+mn-lt"/>
-              <a:ea typeface="+mn-ea"/>
-              <a:cs typeface="+mn-cs"/>
-            </a:endParaRPr>
-          </a:p>
-          <a:p>
-            <a:pPr marL="342900" marR="0" lvl="0" indent="-342900" algn="l" defTabSz="914400" rtl="0" eaLnBrk="1" fontAlgn="auto" latinLnBrk="0" hangingPunct="1">
-              <a:lnSpc>
-                <a:spcPct val="100000"/>
-              </a:lnSpc>
-              <a:spcBef>
-                <a:spcPct val="20000"/>
-              </a:spcBef>
-              <a:spcAft>
-                <a:spcPts val="0"/>
-              </a:spcAft>
-              <a:buClrTx/>
-              <a:buSzTx/>
-              <a:tabLst/>
-              <a:defRPr/>
-            </a:pPr>
-            <a:endParaRPr kumimoji="0" lang="en-US" sz="3200" b="0" i="0" u="none" strike="noStrike" kern="1200" cap="none" spc="0" normalizeH="0" baseline="0" noProof="0" dirty="0" smtClean="0">
-              <a:ln>
-                <a:noFill/>
-              </a:ln>
-              <a:solidFill>
-                <a:schemeClr val="tx1"/>
-              </a:solidFill>
-              <a:effectLst/>
-              <a:uLnTx/>
-              <a:uFillTx/>
-              <a:latin typeface="+mn-lt"/>
-              <a:ea typeface="+mn-ea"/>
-              <a:cs typeface="+mn-cs"/>
-            </a:endParaRPr>
+              <a:t>Reuse</a:t>
+            </a:r>
           </a:p>
           <a:p>
             <a:pPr marL="342900" marR="0" lvl="0" indent="-342900" algn="l" defTabSz="914400" rtl="0" eaLnBrk="1" fontAlgn="auto" latinLnBrk="0" hangingPunct="1">
@@ -5608,7 +5444,148 @@
               <a:tabLst/>
               <a:defRPr/>
             </a:pPr>
-            <a:endParaRPr kumimoji="0" lang="en-US" sz="3200" b="0" i="0" u="none" strike="noStrike" kern="1200" cap="none" spc="0" normalizeH="0" baseline="0" noProof="0" dirty="0" smtClean="0">
+            <a:r>
+              <a:rPr kumimoji="0" lang="en-US" sz="3200" b="0" i="0" u="none" strike="noStrike" kern="1200" cap="none" spc="0" normalizeH="0" baseline="0" noProof="0" smtClean="0">
+                <a:ln>
+                  <a:noFill/>
+                </a:ln>
+                <a:solidFill>
+                  <a:schemeClr val="tx1"/>
+                </a:solidFill>
+                <a:effectLst/>
+                <a:uLnTx/>
+                <a:uFillTx/>
+                <a:latin typeface="+mn-lt"/>
+                <a:ea typeface="+mn-ea"/>
+                <a:cs typeface="+mn-cs"/>
+              </a:rPr>
+              <a:t>Simplicity</a:t>
+            </a:r>
+          </a:p>
+          <a:p>
+            <a:pPr marL="342900" marR="0" lvl="0" indent="-342900" algn="l" defTabSz="914400" rtl="0" eaLnBrk="1" fontAlgn="auto" latinLnBrk="0" hangingPunct="1">
+              <a:lnSpc>
+                <a:spcPct val="100000"/>
+              </a:lnSpc>
+              <a:spcBef>
+                <a:spcPct val="20000"/>
+              </a:spcBef>
+              <a:spcAft>
+                <a:spcPts val="0"/>
+              </a:spcAft>
+              <a:buClrTx/>
+              <a:buSzTx/>
+              <a:buFont typeface="Arial" pitchFamily="34" charset="0"/>
+              <a:buChar char="•"/>
+              <a:tabLst/>
+              <a:defRPr/>
+            </a:pPr>
+            <a:r>
+              <a:rPr kumimoji="0" lang="en-US" sz="3200" b="0" i="0" u="none" strike="noStrike" kern="1200" cap="none" spc="0" normalizeH="0" baseline="0" noProof="0" smtClean="0">
+                <a:ln>
+                  <a:noFill/>
+                </a:ln>
+                <a:solidFill>
+                  <a:schemeClr val="tx1"/>
+                </a:solidFill>
+                <a:effectLst/>
+                <a:uLnTx/>
+                <a:uFillTx/>
+                <a:latin typeface="+mn-lt"/>
+                <a:ea typeface="+mn-ea"/>
+                <a:cs typeface="+mn-cs"/>
+              </a:rPr>
+              <a:t>Construction velocity</a:t>
+            </a:r>
+          </a:p>
+          <a:p>
+            <a:pPr marL="342900" marR="0" lvl="0" indent="-342900" algn="l" defTabSz="914400" rtl="0" eaLnBrk="1" fontAlgn="auto" latinLnBrk="0" hangingPunct="1">
+              <a:lnSpc>
+                <a:spcPct val="100000"/>
+              </a:lnSpc>
+              <a:spcBef>
+                <a:spcPct val="20000"/>
+              </a:spcBef>
+              <a:spcAft>
+                <a:spcPts val="0"/>
+              </a:spcAft>
+              <a:buClrTx/>
+              <a:buSzTx/>
+              <a:buFont typeface="Arial" pitchFamily="34" charset="0"/>
+              <a:buChar char="•"/>
+              <a:tabLst/>
+              <a:defRPr/>
+            </a:pPr>
+            <a:r>
+              <a:rPr kumimoji="0" lang="en-US" sz="3200" b="0" i="0" u="none" strike="noStrike" kern="1200" cap="none" spc="0" normalizeH="0" baseline="0" noProof="0" smtClean="0">
+                <a:ln>
+                  <a:noFill/>
+                </a:ln>
+                <a:solidFill>
+                  <a:schemeClr val="tx1"/>
+                </a:solidFill>
+                <a:effectLst/>
+                <a:uLnTx/>
+                <a:uFillTx/>
+                <a:latin typeface="+mn-lt"/>
+                <a:ea typeface="+mn-ea"/>
+                <a:cs typeface="+mn-cs"/>
+              </a:rPr>
+              <a:t>Fun</a:t>
+            </a:r>
+          </a:p>
+          <a:p>
+            <a:pPr marL="342900" marR="0" lvl="0" indent="-342900" algn="l" defTabSz="914400" rtl="0" eaLnBrk="1" fontAlgn="auto" latinLnBrk="0" hangingPunct="1">
+              <a:lnSpc>
+                <a:spcPct val="100000"/>
+              </a:lnSpc>
+              <a:spcBef>
+                <a:spcPct val="20000"/>
+              </a:spcBef>
+              <a:spcAft>
+                <a:spcPts val="0"/>
+              </a:spcAft>
+              <a:buClrTx/>
+              <a:buSzTx/>
+              <a:buFont typeface="Arial" pitchFamily="34" charset="0"/>
+              <a:buChar char="•"/>
+              <a:tabLst/>
+              <a:defRPr/>
+            </a:pPr>
+            <a:endParaRPr kumimoji="0" lang="en-US" sz="3200" b="0" i="0" u="none" strike="noStrike" kern="1200" cap="none" spc="0" normalizeH="0" baseline="0" noProof="0" smtClean="0">
+              <a:ln>
+                <a:noFill/>
+              </a:ln>
+              <a:solidFill>
+                <a:schemeClr val="tx1"/>
+              </a:solidFill>
+              <a:effectLst/>
+              <a:uLnTx/>
+              <a:uFillTx/>
+              <a:latin typeface="+mn-lt"/>
+              <a:ea typeface="+mn-ea"/>
+              <a:cs typeface="+mn-cs"/>
+            </a:endParaRPr>
+          </a:p>
+          <a:p>
+            <a:pPr marL="342900" marR="0" lvl="0" indent="-342900" algn="l" defTabSz="914400" rtl="0" eaLnBrk="1" fontAlgn="auto" latinLnBrk="0" hangingPunct="1">
+              <a:lnSpc>
+                <a:spcPct val="100000"/>
+              </a:lnSpc>
+              <a:spcBef>
+                <a:spcPct val="20000"/>
+              </a:spcBef>
+              <a:spcAft>
+                <a:spcPts val="0"/>
+              </a:spcAft>
+              <a:buClrTx/>
+              <a:buSzTx/>
+              <a:buFont typeface="Arial" pitchFamily="34" charset="0"/>
+              <a:buChar char="•"/>
+              <a:tabLst/>
+              <a:defRPr/>
+            </a:pPr>
+            <a:endParaRPr kumimoji="0" lang="en-US" sz="3200" b="0" i="0" u="none" strike="noStrike" kern="1200" cap="none" spc="0" normalizeH="0" baseline="0" noProof="0" smtClean="0">
               <a:ln>
                 <a:noFill/>
               </a:ln>

</xml_diff>

<commit_message>
Revert "Revert "changed up a slide""
This reverts commit 4f3fa06628d2a838a77274d5af8c2503ff40c6ac.
</commit_message>
<xml_diff>
--- a/Headspring.pptx
+++ b/Headspring.pptx
@@ -215,7 +215,7 @@
             <a:fld id="{7072611E-5E6A-420E-9E03-EF7E4D75AE23}" type="datetimeFigureOut">
               <a:rPr lang="en-US" smtClean="0"/>
               <a:pPr/>
-              <a:t>12/15/2009</a:t>
+              <a:t>3/11/2010</a:t>
             </a:fld>
             <a:endParaRPr lang="en-US"/>
           </a:p>
@@ -587,7 +587,6 @@
               <a:rPr lang="en-US" baseline="0" dirty="0" smtClean="0"/>
               <a:t>Imagine you have an email sending class.. Let’s call it.. </a:t>
             </a:r>
-            <a:endParaRPr lang="en-US" baseline="0" dirty="0" smtClean="0"/>
           </a:p>
         </p:txBody>
       </p:sp>
@@ -1503,7 +1502,7 @@
             <a:fld id="{2F1B85D0-A8DC-4B1B-920D-F0E34F47ADD3}" type="datetimeFigureOut">
               <a:rPr lang="en-US" smtClean="0"/>
               <a:pPr/>
-              <a:t>12/15/2009</a:t>
+              <a:t>3/11/2010</a:t>
             </a:fld>
             <a:endParaRPr lang="en-US"/>
           </a:p>
@@ -1670,7 +1669,7 @@
             <a:fld id="{2F1B85D0-A8DC-4B1B-920D-F0E34F47ADD3}" type="datetimeFigureOut">
               <a:rPr lang="en-US" smtClean="0"/>
               <a:pPr/>
-              <a:t>12/15/2009</a:t>
+              <a:t>3/11/2010</a:t>
             </a:fld>
             <a:endParaRPr lang="en-US"/>
           </a:p>
@@ -1847,7 +1846,7 @@
             <a:fld id="{2F1B85D0-A8DC-4B1B-920D-F0E34F47ADD3}" type="datetimeFigureOut">
               <a:rPr lang="en-US" smtClean="0"/>
               <a:pPr/>
-              <a:t>12/15/2009</a:t>
+              <a:t>3/11/2010</a:t>
             </a:fld>
             <a:endParaRPr lang="en-US"/>
           </a:p>
@@ -2014,7 +2013,7 @@
             <a:fld id="{2F1B85D0-A8DC-4B1B-920D-F0E34F47ADD3}" type="datetimeFigureOut">
               <a:rPr lang="en-US" smtClean="0"/>
               <a:pPr/>
-              <a:t>12/15/2009</a:t>
+              <a:t>3/11/2010</a:t>
             </a:fld>
             <a:endParaRPr lang="en-US"/>
           </a:p>
@@ -2257,7 +2256,7 @@
             <a:fld id="{2F1B85D0-A8DC-4B1B-920D-F0E34F47ADD3}" type="datetimeFigureOut">
               <a:rPr lang="en-US" smtClean="0"/>
               <a:pPr/>
-              <a:t>12/15/2009</a:t>
+              <a:t>3/11/2010</a:t>
             </a:fld>
             <a:endParaRPr lang="en-US"/>
           </a:p>
@@ -2542,7 +2541,7 @@
             <a:fld id="{2F1B85D0-A8DC-4B1B-920D-F0E34F47ADD3}" type="datetimeFigureOut">
               <a:rPr lang="en-US" smtClean="0"/>
               <a:pPr/>
-              <a:t>12/15/2009</a:t>
+              <a:t>3/11/2010</a:t>
             </a:fld>
             <a:endParaRPr lang="en-US"/>
           </a:p>
@@ -2961,7 +2960,7 @@
             <a:fld id="{2F1B85D0-A8DC-4B1B-920D-F0E34F47ADD3}" type="datetimeFigureOut">
               <a:rPr lang="en-US" smtClean="0"/>
               <a:pPr/>
-              <a:t>12/15/2009</a:t>
+              <a:t>3/11/2010</a:t>
             </a:fld>
             <a:endParaRPr lang="en-US"/>
           </a:p>
@@ -3076,7 +3075,7 @@
             <a:fld id="{2F1B85D0-A8DC-4B1B-920D-F0E34F47ADD3}" type="datetimeFigureOut">
               <a:rPr lang="en-US" smtClean="0"/>
               <a:pPr/>
-              <a:t>12/15/2009</a:t>
+              <a:t>3/11/2010</a:t>
             </a:fld>
             <a:endParaRPr lang="en-US"/>
           </a:p>
@@ -3168,7 +3167,7 @@
             <a:fld id="{2F1B85D0-A8DC-4B1B-920D-F0E34F47ADD3}" type="datetimeFigureOut">
               <a:rPr lang="en-US" smtClean="0"/>
               <a:pPr/>
-              <a:t>12/15/2009</a:t>
+              <a:t>3/11/2010</a:t>
             </a:fld>
             <a:endParaRPr lang="en-US"/>
           </a:p>
@@ -3442,7 +3441,7 @@
             <a:fld id="{2F1B85D0-A8DC-4B1B-920D-F0E34F47ADD3}" type="datetimeFigureOut">
               <a:rPr lang="en-US" smtClean="0"/>
               <a:pPr/>
-              <a:t>12/15/2009</a:t>
+              <a:t>3/11/2010</a:t>
             </a:fld>
             <a:endParaRPr lang="en-US"/>
           </a:p>
@@ -3692,7 +3691,7 @@
             <a:fld id="{2F1B85D0-A8DC-4B1B-920D-F0E34F47ADD3}" type="datetimeFigureOut">
               <a:rPr lang="en-US" smtClean="0"/>
               <a:pPr/>
-              <a:t>12/15/2009</a:t>
+              <a:t>3/11/2010</a:t>
             </a:fld>
             <a:endParaRPr lang="en-US"/>
           </a:p>
@@ -3902,7 +3901,7 @@
             <a:fld id="{2F1B85D0-A8DC-4B1B-920D-F0E34F47ADD3}" type="datetimeFigureOut">
               <a:rPr lang="en-US" smtClean="0"/>
               <a:pPr/>
-              <a:t>12/15/2009</a:t>
+              <a:t>3/11/2010</a:t>
             </a:fld>
             <a:endParaRPr lang="en-US"/>
           </a:p>
@@ -5373,7 +5372,7 @@
               <a:defRPr/>
             </a:pPr>
             <a:r>
-              <a:rPr kumimoji="0" lang="en-US" sz="3200" b="0" i="0" u="none" strike="noStrike" kern="1200" cap="none" spc="0" normalizeH="0" baseline="0" noProof="0" smtClean="0">
+              <a:rPr kumimoji="0" lang="en-US" sz="4000" b="0" i="0" u="none" strike="noStrike" kern="1200" cap="none" spc="0" normalizeH="0" baseline="0" noProof="0" dirty="0" smtClean="0">
                 <a:ln>
                   <a:noFill/>
                 </a:ln>
@@ -5387,8 +5386,41 @@
                 <a:ea typeface="+mn-ea"/>
                 <a:cs typeface="+mn-cs"/>
               </a:rPr>
-              <a:t>Testing</a:t>
-            </a:r>
+              <a:t>Testable &amp; TDD</a:t>
+            </a:r>
+            <a:r>
+              <a:rPr lang="en-US" sz="4000" dirty="0" smtClean="0"/>
+              <a:t>-friendly</a:t>
+            </a:r>
+            <a:endParaRPr kumimoji="0" lang="en-US" sz="4000" b="0" i="0" u="none" strike="noStrike" kern="1200" cap="none" spc="0" normalizeH="0" baseline="0" noProof="0" dirty="0" smtClean="0">
+              <a:ln>
+                <a:noFill/>
+              </a:ln>
+              <a:solidFill>
+                <a:schemeClr val="tx1"/>
+              </a:solidFill>
+              <a:effectLst/>
+              <a:uLnTx/>
+              <a:uFillTx/>
+              <a:latin typeface="+mn-lt"/>
+              <a:ea typeface="+mn-ea"/>
+              <a:cs typeface="+mn-cs"/>
+            </a:endParaRPr>
+          </a:p>
+          <a:p>
+            <a:pPr marL="342900" indent="-342900">
+              <a:spcBef>
+                <a:spcPct val="20000"/>
+              </a:spcBef>
+              <a:buFont typeface="Arial" pitchFamily="34" charset="0"/>
+              <a:buChar char="•"/>
+              <a:defRPr/>
+            </a:pPr>
+            <a:r>
+              <a:rPr lang="en-US" sz="4000" dirty="0" smtClean="0"/>
+              <a:t>Simplicity</a:t>
+            </a:r>
+            <a:endParaRPr lang="en-US" sz="4000" dirty="0" smtClean="0"/>
           </a:p>
           <a:p>
             <a:pPr marL="342900" marR="0" lvl="0" indent="-342900" algn="l" defTabSz="914400" rtl="0" eaLnBrk="1" fontAlgn="auto" latinLnBrk="0" hangingPunct="1">
@@ -5409,7 +5441,7 @@
               <a:defRPr/>
             </a:pPr>
             <a:r>
-              <a:rPr kumimoji="0" lang="en-US" sz="3200" b="0" i="0" u="none" strike="noStrike" kern="1200" cap="none" spc="0" normalizeH="0" baseline="0" noProof="0" smtClean="0">
+              <a:rPr kumimoji="0" lang="en-US" sz="4000" b="0" i="0" u="none" strike="noStrike" kern="1200" cap="none" spc="0" normalizeH="0" baseline="0" noProof="0" dirty="0" smtClean="0">
                 <a:ln>
                   <a:noFill/>
                 </a:ln>
@@ -5423,8 +5455,140 @@
                 <a:ea typeface="+mn-ea"/>
                 <a:cs typeface="+mn-cs"/>
               </a:rPr>
-              <a:t>Reuse</a:t>
-            </a:r>
+              <a:t>Reuse &amp; DRY</a:t>
+            </a:r>
+            <a:endParaRPr kumimoji="0" lang="en-US" sz="4000" b="0" i="0" u="none" strike="noStrike" kern="1200" cap="none" spc="0" normalizeH="0" baseline="0" noProof="0" dirty="0" smtClean="0">
+              <a:ln>
+                <a:noFill/>
+              </a:ln>
+              <a:solidFill>
+                <a:schemeClr val="tx1"/>
+              </a:solidFill>
+              <a:effectLst/>
+              <a:uLnTx/>
+              <a:uFillTx/>
+              <a:latin typeface="+mn-lt"/>
+              <a:ea typeface="+mn-ea"/>
+              <a:cs typeface="+mn-cs"/>
+            </a:endParaRPr>
+          </a:p>
+          <a:p>
+            <a:pPr marL="342900" marR="0" lvl="0" indent="-342900" algn="l" defTabSz="914400" rtl="0" eaLnBrk="1" fontAlgn="auto" latinLnBrk="0" hangingPunct="1">
+              <a:lnSpc>
+                <a:spcPct val="100000"/>
+              </a:lnSpc>
+              <a:spcBef>
+                <a:spcPct val="20000"/>
+              </a:spcBef>
+              <a:spcAft>
+                <a:spcPts val="0"/>
+              </a:spcAft>
+              <a:buClrTx/>
+              <a:buSzTx/>
+              <a:tabLst/>
+              <a:defRPr/>
+            </a:pPr>
+            <a:endParaRPr lang="en-US" sz="4000" dirty="0" smtClean="0"/>
+          </a:p>
+          <a:p>
+            <a:pPr marL="342900" marR="0" lvl="0" indent="-342900" algn="l" defTabSz="914400" rtl="0" eaLnBrk="1" fontAlgn="auto" latinLnBrk="0" hangingPunct="1">
+              <a:lnSpc>
+                <a:spcPct val="100000"/>
+              </a:lnSpc>
+              <a:spcBef>
+                <a:spcPct val="20000"/>
+              </a:spcBef>
+              <a:spcAft>
+                <a:spcPts val="0"/>
+              </a:spcAft>
+              <a:buClrTx/>
+              <a:buSzTx/>
+              <a:tabLst/>
+              <a:defRPr/>
+            </a:pPr>
+            <a:r>
+              <a:rPr lang="en-US" sz="4000" dirty="0" smtClean="0"/>
+              <a:t>All roads lead to c</a:t>
+            </a:r>
+            <a:r>
+              <a:rPr kumimoji="0" lang="en-US" sz="4000" b="0" i="0" u="none" strike="noStrike" kern="1200" cap="none" spc="0" normalizeH="0" baseline="0" noProof="0" dirty="0" err="1" smtClean="0">
+                <a:ln>
+                  <a:noFill/>
+                </a:ln>
+                <a:solidFill>
+                  <a:schemeClr val="tx1"/>
+                </a:solidFill>
+                <a:effectLst/>
+                <a:uLnTx/>
+                <a:uFillTx/>
+                <a:latin typeface="+mn-lt"/>
+                <a:ea typeface="+mn-ea"/>
+                <a:cs typeface="+mn-cs"/>
+              </a:rPr>
+              <a:t>onstruction</a:t>
+            </a:r>
+            <a:r>
+              <a:rPr kumimoji="0" lang="en-US" sz="4000" b="0" i="0" u="none" strike="noStrike" kern="1200" cap="none" spc="0" normalizeH="0" baseline="0" noProof="0" dirty="0" smtClean="0">
+                <a:ln>
+                  <a:noFill/>
+                </a:ln>
+                <a:solidFill>
+                  <a:schemeClr val="tx1"/>
+                </a:solidFill>
+                <a:effectLst/>
+                <a:uLnTx/>
+                <a:uFillTx/>
+                <a:latin typeface="+mn-lt"/>
+                <a:ea typeface="+mn-ea"/>
+                <a:cs typeface="+mn-cs"/>
+              </a:rPr>
+              <a:t> velocity</a:t>
+            </a:r>
+            <a:endParaRPr kumimoji="0" lang="en-US" sz="4000" b="0" i="0" u="none" strike="noStrike" kern="1200" cap="none" spc="0" normalizeH="0" baseline="0" noProof="0" dirty="0" smtClean="0">
+              <a:ln>
+                <a:noFill/>
+              </a:ln>
+              <a:solidFill>
+                <a:schemeClr val="tx1"/>
+              </a:solidFill>
+              <a:effectLst/>
+              <a:uLnTx/>
+              <a:uFillTx/>
+              <a:latin typeface="+mn-lt"/>
+              <a:ea typeface="+mn-ea"/>
+              <a:cs typeface="+mn-cs"/>
+            </a:endParaRPr>
+          </a:p>
+          <a:p>
+            <a:pPr marL="342900" marR="0" lvl="0" indent="-342900" algn="l" defTabSz="914400" rtl="0" eaLnBrk="1" fontAlgn="auto" latinLnBrk="0" hangingPunct="1">
+              <a:lnSpc>
+                <a:spcPct val="100000"/>
+              </a:lnSpc>
+              <a:spcBef>
+                <a:spcPct val="20000"/>
+              </a:spcBef>
+              <a:spcAft>
+                <a:spcPts val="0"/>
+              </a:spcAft>
+              <a:buClrTx/>
+              <a:buSzTx/>
+              <a:tabLst/>
+              <a:defRPr/>
+            </a:pPr>
+            <a:endParaRPr kumimoji="0" lang="en-US" sz="3200" b="0" i="0" u="none" strike="noStrike" kern="1200" cap="none" spc="0" normalizeH="0" baseline="0" noProof="0" dirty="0" smtClean="0">
+              <a:ln>
+                <a:noFill/>
+              </a:ln>
+              <a:solidFill>
+                <a:schemeClr val="tx1"/>
+              </a:solidFill>
+              <a:effectLst/>
+              <a:uLnTx/>
+              <a:uFillTx/>
+              <a:latin typeface="+mn-lt"/>
+              <a:ea typeface="+mn-ea"/>
+              <a:cs typeface="+mn-cs"/>
+            </a:endParaRPr>
           </a:p>
           <a:p>
             <a:pPr marL="342900" marR="0" lvl="0" indent="-342900" algn="l" defTabSz="914400" rtl="0" eaLnBrk="1" fontAlgn="auto" latinLnBrk="0" hangingPunct="1">
@@ -5444,148 +5608,7 @@
               <a:tabLst/>
               <a:defRPr/>
             </a:pPr>
-            <a:r>
-              <a:rPr kumimoji="0" lang="en-US" sz="3200" b="0" i="0" u="none" strike="noStrike" kern="1200" cap="none" spc="0" normalizeH="0" baseline="0" noProof="0" smtClean="0">
-                <a:ln>
-                  <a:noFill/>
-                </a:ln>
-                <a:solidFill>
-                  <a:schemeClr val="tx1"/>
-                </a:solidFill>
-                <a:effectLst/>
-                <a:uLnTx/>
-                <a:uFillTx/>
-                <a:latin typeface="+mn-lt"/>
-                <a:ea typeface="+mn-ea"/>
-                <a:cs typeface="+mn-cs"/>
-              </a:rPr>
-              <a:t>Simplicity</a:t>
-            </a:r>
-          </a:p>
-          <a:p>
-            <a:pPr marL="342900" marR="0" lvl="0" indent="-342900" algn="l" defTabSz="914400" rtl="0" eaLnBrk="1" fontAlgn="auto" latinLnBrk="0" hangingPunct="1">
-              <a:lnSpc>
-                <a:spcPct val="100000"/>
-              </a:lnSpc>
-              <a:spcBef>
-                <a:spcPct val="20000"/>
-              </a:spcBef>
-              <a:spcAft>
-                <a:spcPts val="0"/>
-              </a:spcAft>
-              <a:buClrTx/>
-              <a:buSzTx/>
-              <a:buFont typeface="Arial" pitchFamily="34" charset="0"/>
-              <a:buChar char="•"/>
-              <a:tabLst/>
-              <a:defRPr/>
-            </a:pPr>
-            <a:r>
-              <a:rPr kumimoji="0" lang="en-US" sz="3200" b="0" i="0" u="none" strike="noStrike" kern="1200" cap="none" spc="0" normalizeH="0" baseline="0" noProof="0" smtClean="0">
-                <a:ln>
-                  <a:noFill/>
-                </a:ln>
-                <a:solidFill>
-                  <a:schemeClr val="tx1"/>
-                </a:solidFill>
-                <a:effectLst/>
-                <a:uLnTx/>
-                <a:uFillTx/>
-                <a:latin typeface="+mn-lt"/>
-                <a:ea typeface="+mn-ea"/>
-                <a:cs typeface="+mn-cs"/>
-              </a:rPr>
-              <a:t>Construction velocity</a:t>
-            </a:r>
-          </a:p>
-          <a:p>
-            <a:pPr marL="342900" marR="0" lvl="0" indent="-342900" algn="l" defTabSz="914400" rtl="0" eaLnBrk="1" fontAlgn="auto" latinLnBrk="0" hangingPunct="1">
-              <a:lnSpc>
-                <a:spcPct val="100000"/>
-              </a:lnSpc>
-              <a:spcBef>
-                <a:spcPct val="20000"/>
-              </a:spcBef>
-              <a:spcAft>
-                <a:spcPts val="0"/>
-              </a:spcAft>
-              <a:buClrTx/>
-              <a:buSzTx/>
-              <a:buFont typeface="Arial" pitchFamily="34" charset="0"/>
-              <a:buChar char="•"/>
-              <a:tabLst/>
-              <a:defRPr/>
-            </a:pPr>
-            <a:r>
-              <a:rPr kumimoji="0" lang="en-US" sz="3200" b="0" i="0" u="none" strike="noStrike" kern="1200" cap="none" spc="0" normalizeH="0" baseline="0" noProof="0" smtClean="0">
-                <a:ln>
-                  <a:noFill/>
-                </a:ln>
-                <a:solidFill>
-                  <a:schemeClr val="tx1"/>
-                </a:solidFill>
-                <a:effectLst/>
-                <a:uLnTx/>
-                <a:uFillTx/>
-                <a:latin typeface="+mn-lt"/>
-                <a:ea typeface="+mn-ea"/>
-                <a:cs typeface="+mn-cs"/>
-              </a:rPr>
-              <a:t>Fun</a:t>
-            </a:r>
-          </a:p>
-          <a:p>
-            <a:pPr marL="342900" marR="0" lvl="0" indent="-342900" algn="l" defTabSz="914400" rtl="0" eaLnBrk="1" fontAlgn="auto" latinLnBrk="0" hangingPunct="1">
-              <a:lnSpc>
-                <a:spcPct val="100000"/>
-              </a:lnSpc>
-              <a:spcBef>
-                <a:spcPct val="20000"/>
-              </a:spcBef>
-              <a:spcAft>
-                <a:spcPts val="0"/>
-              </a:spcAft>
-              <a:buClrTx/>
-              <a:buSzTx/>
-              <a:buFont typeface="Arial" pitchFamily="34" charset="0"/>
-              <a:buChar char="•"/>
-              <a:tabLst/>
-              <a:defRPr/>
-            </a:pPr>
-            <a:endParaRPr kumimoji="0" lang="en-US" sz="3200" b="0" i="0" u="none" strike="noStrike" kern="1200" cap="none" spc="0" normalizeH="0" baseline="0" noProof="0" smtClean="0">
-              <a:ln>
-                <a:noFill/>
-              </a:ln>
-              <a:solidFill>
-                <a:schemeClr val="tx1"/>
-              </a:solidFill>
-              <a:effectLst/>
-              <a:uLnTx/>
-              <a:uFillTx/>
-              <a:latin typeface="+mn-lt"/>
-              <a:ea typeface="+mn-ea"/>
-              <a:cs typeface="+mn-cs"/>
-            </a:endParaRPr>
-          </a:p>
-          <a:p>
-            <a:pPr marL="342900" marR="0" lvl="0" indent="-342900" algn="l" defTabSz="914400" rtl="0" eaLnBrk="1" fontAlgn="auto" latinLnBrk="0" hangingPunct="1">
-              <a:lnSpc>
-                <a:spcPct val="100000"/>
-              </a:lnSpc>
-              <a:spcBef>
-                <a:spcPct val="20000"/>
-              </a:spcBef>
-              <a:spcAft>
-                <a:spcPts val="0"/>
-              </a:spcAft>
-              <a:buClrTx/>
-              <a:buSzTx/>
-              <a:buFont typeface="Arial" pitchFamily="34" charset="0"/>
-              <a:buChar char="•"/>
-              <a:tabLst/>
-              <a:defRPr/>
-            </a:pPr>
-            <a:endParaRPr kumimoji="0" lang="en-US" sz="3200" b="0" i="0" u="none" strike="noStrike" kern="1200" cap="none" spc="0" normalizeH="0" baseline="0" noProof="0" smtClean="0">
+            <a:endParaRPr kumimoji="0" lang="en-US" sz="3200" b="0" i="0" u="none" strike="noStrike" kern="1200" cap="none" spc="0" normalizeH="0" baseline="0" noProof="0" dirty="0" smtClean="0">
               <a:ln>
                 <a:noFill/>
               </a:ln>

</xml_diff>